<commit_message>
Software displaying has been added
</commit_message>
<xml_diff>
--- a/Курсова робота на тему.pptx
+++ b/Курсова робота на тему.pptx
@@ -6,6 +6,13 @@
   </p:sldMasterIdLst>
   <p:sldIdLst>
     <p:sldId id="256" r:id="rId2"/>
+    <p:sldId id="257" r:id="rId3"/>
+    <p:sldId id="260" r:id="rId4"/>
+    <p:sldId id="261" r:id="rId5"/>
+    <p:sldId id="262" r:id="rId6"/>
+    <p:sldId id="263" r:id="rId7"/>
+    <p:sldId id="264" r:id="rId8"/>
+    <p:sldId id="265" r:id="rId9"/>
   </p:sldIdLst>
   <p:sldSz cx="12192000" cy="6858000"/>
   <p:notesSz cx="6858000" cy="9144000"/>
@@ -5860,6 +5867,915 @@
 </p:sld>
 </file>
 
+<file path=ppt/slides/slide2.xml><?xml version="1.0" encoding="utf-8"?>
+<p:sld xmlns:a="http://schemas.openxmlformats.org/drawingml/2006/main" xmlns:r="http://schemas.openxmlformats.org/officeDocument/2006/relationships" xmlns:p="http://schemas.openxmlformats.org/presentationml/2006/main">
+  <p:cSld>
+    <p:spTree>
+      <p:nvGrpSpPr>
+        <p:cNvPr id="1" name=""/>
+        <p:cNvGrpSpPr/>
+        <p:nvPr/>
+      </p:nvGrpSpPr>
+      <p:grpSpPr>
+        <a:xfrm>
+          <a:off x="0" y="0"/>
+          <a:ext cx="0" cy="0"/>
+          <a:chOff x="0" y="0"/>
+          <a:chExt cx="0" cy="0"/>
+        </a:xfrm>
+      </p:grpSpPr>
+      <p:sp>
+        <p:nvSpPr>
+          <p:cNvPr id="2" name="Заголовок 1">
+            <a:extLst>
+              <a:ext uri="{FF2B5EF4-FFF2-40B4-BE49-F238E27FC236}">
+                <a16:creationId xmlns:a16="http://schemas.microsoft.com/office/drawing/2014/main" id="{D0AAF69D-A1BF-47B9-A76C-E9EB1DC28771}"/>
+              </a:ext>
+            </a:extLst>
+          </p:cNvPr>
+          <p:cNvSpPr>
+            <a:spLocks noGrp="1"/>
+          </p:cNvSpPr>
+          <p:nvPr>
+            <p:ph type="title"/>
+          </p:nvPr>
+        </p:nvSpPr>
+        <p:spPr/>
+        <p:txBody>
+          <a:bodyPr/>
+          <a:lstStyle/>
+          <a:p>
+            <a:r>
+              <a:rPr lang="uk-UA" dirty="0"/>
+              <a:t>Технічне завдання</a:t>
+            </a:r>
+            <a:endParaRPr lang="ru-RU" dirty="0"/>
+          </a:p>
+        </p:txBody>
+      </p:sp>
+      <p:sp>
+        <p:nvSpPr>
+          <p:cNvPr id="3" name="Объект 2">
+            <a:extLst>
+              <a:ext uri="{FF2B5EF4-FFF2-40B4-BE49-F238E27FC236}">
+                <a16:creationId xmlns:a16="http://schemas.microsoft.com/office/drawing/2014/main" id="{8AF444F8-22C4-44D0-8E5A-F20A05B3CA4C}"/>
+              </a:ext>
+            </a:extLst>
+          </p:cNvPr>
+          <p:cNvSpPr>
+            <a:spLocks noGrp="1"/>
+          </p:cNvSpPr>
+          <p:nvPr>
+            <p:ph idx="1"/>
+          </p:nvPr>
+        </p:nvSpPr>
+        <p:spPr/>
+        <p:txBody>
+          <a:bodyPr>
+            <a:normAutofit lnSpcReduction="10000"/>
+          </a:bodyPr>
+          <a:lstStyle/>
+          <a:p>
+            <a:r>
+              <a:rPr lang="uk-UA" dirty="0"/>
+              <a:t>Програма збору інформації про систему </a:t>
+            </a:r>
+          </a:p>
+          <a:p>
+            <a:r>
+              <a:rPr lang="uk-UA" dirty="0"/>
+              <a:t>Можливості її включають в себе повний набір відомостей про комп'ютер</a:t>
+            </a:r>
+            <a:endParaRPr lang="ru-RU" dirty="0"/>
+          </a:p>
+          <a:p>
+            <a:r>
+              <a:rPr lang="uk-UA" dirty="0"/>
+              <a:t>Функціонально присутні закладки: </a:t>
+            </a:r>
+            <a:endParaRPr lang="ru-RU" dirty="0"/>
+          </a:p>
+          <a:p>
+            <a:pPr lvl="1"/>
+            <a:r>
+              <a:rPr lang="uk-UA" dirty="0" err="1"/>
+              <a:t>System</a:t>
+            </a:r>
+            <a:r>
+              <a:rPr lang="uk-UA" dirty="0"/>
+              <a:t> - містить відомості про вміст комп'ютера, </a:t>
+            </a:r>
+            <a:endParaRPr lang="ru-RU" dirty="0"/>
+          </a:p>
+          <a:p>
+            <a:pPr lvl="1"/>
+            <a:r>
+              <a:rPr lang="uk-UA" dirty="0" err="1"/>
+              <a:t>Memory</a:t>
+            </a:r>
+            <a:r>
+              <a:rPr lang="uk-UA" dirty="0"/>
+              <a:t> - містить інформацію про оперативну пам'ять, </a:t>
+            </a:r>
+            <a:endParaRPr lang="ru-RU" dirty="0"/>
+          </a:p>
+          <a:p>
+            <a:pPr lvl="1"/>
+            <a:r>
+              <a:rPr lang="uk-UA" dirty="0" err="1"/>
+              <a:t>Software</a:t>
+            </a:r>
+            <a:r>
+              <a:rPr lang="uk-UA" dirty="0"/>
+              <a:t> - показує програмне забезпечення, встановлене на комп'ютері, </a:t>
+            </a:r>
+            <a:endParaRPr lang="ru-RU" dirty="0"/>
+          </a:p>
+          <a:p>
+            <a:pPr lvl="1"/>
+            <a:r>
+              <a:rPr lang="uk-UA" dirty="0" err="1"/>
+              <a:t>Drives</a:t>
+            </a:r>
+            <a:r>
+              <a:rPr lang="uk-UA" dirty="0"/>
+              <a:t> - покаже версію операційної системи, загальну інформацію по запущеним процесам, ниткам, віртуальним машинам, </a:t>
+            </a:r>
+          </a:p>
+          <a:p>
+            <a:pPr lvl="1"/>
+            <a:r>
+              <a:rPr lang="uk-UA" dirty="0" err="1"/>
+              <a:t>Summary</a:t>
+            </a:r>
+            <a:r>
+              <a:rPr lang="uk-UA" dirty="0"/>
+              <a:t> - покаже версію операційної системи, загальну інформацію по запущеним процесам, ниткам, віртуальним машинам</a:t>
+            </a:r>
+            <a:endParaRPr lang="ru-RU" dirty="0"/>
+          </a:p>
+          <a:p>
+            <a:pPr lvl="1"/>
+            <a:r>
+              <a:rPr lang="uk-UA" dirty="0"/>
+              <a:t>I/O </a:t>
+            </a:r>
+            <a:r>
+              <a:rPr lang="uk-UA" dirty="0" err="1"/>
+              <a:t>Devices</a:t>
+            </a:r>
+            <a:r>
+              <a:rPr lang="uk-UA" dirty="0"/>
+              <a:t> - містить інформацію про диски </a:t>
+            </a:r>
+            <a:endParaRPr lang="ru-RU" dirty="0"/>
+          </a:p>
+          <a:p>
+            <a:endParaRPr lang="ru-RU" dirty="0"/>
+          </a:p>
+        </p:txBody>
+      </p:sp>
+    </p:spTree>
+    <p:extLst>
+      <p:ext uri="{BB962C8B-B14F-4D97-AF65-F5344CB8AC3E}">
+        <p14:creationId xmlns:p14="http://schemas.microsoft.com/office/powerpoint/2010/main" val="2922523833"/>
+      </p:ext>
+    </p:extLst>
+  </p:cSld>
+  <p:clrMapOvr>
+    <a:masterClrMapping/>
+  </p:clrMapOvr>
+</p:sld>
+</file>
+
+<file path=ppt/slides/slide3.xml><?xml version="1.0" encoding="utf-8"?>
+<p:sld xmlns:a="http://schemas.openxmlformats.org/drawingml/2006/main" xmlns:r="http://schemas.openxmlformats.org/officeDocument/2006/relationships" xmlns:p="http://schemas.openxmlformats.org/presentationml/2006/main">
+  <p:cSld>
+    <p:spTree>
+      <p:nvGrpSpPr>
+        <p:cNvPr id="1" name=""/>
+        <p:cNvGrpSpPr/>
+        <p:nvPr/>
+      </p:nvGrpSpPr>
+      <p:grpSpPr>
+        <a:xfrm>
+          <a:off x="0" y="0"/>
+          <a:ext cx="0" cy="0"/>
+          <a:chOff x="0" y="0"/>
+          <a:chExt cx="0" cy="0"/>
+        </a:xfrm>
+      </p:grpSpPr>
+      <p:sp>
+        <p:nvSpPr>
+          <p:cNvPr id="2" name="Заголовок 1">
+            <a:extLst>
+              <a:ext uri="{FF2B5EF4-FFF2-40B4-BE49-F238E27FC236}">
+                <a16:creationId xmlns:a16="http://schemas.microsoft.com/office/drawing/2014/main" id="{FD48F228-7FA6-4B38-96D9-54048ED72CEE}"/>
+              </a:ext>
+            </a:extLst>
+          </p:cNvPr>
+          <p:cNvSpPr>
+            <a:spLocks noGrp="1"/>
+          </p:cNvSpPr>
+          <p:nvPr>
+            <p:ph type="ctrTitle"/>
+          </p:nvPr>
+        </p:nvSpPr>
+        <p:spPr/>
+        <p:txBody>
+          <a:bodyPr/>
+          <a:lstStyle/>
+          <a:p>
+            <a:r>
+              <a:rPr lang="uk-UA" dirty="0"/>
+              <a:t>Можливі засоби розробки</a:t>
+            </a:r>
+            <a:endParaRPr lang="ru-RU" dirty="0"/>
+          </a:p>
+        </p:txBody>
+      </p:sp>
+      <p:sp>
+        <p:nvSpPr>
+          <p:cNvPr id="3" name="Подзаголовок 2">
+            <a:extLst>
+              <a:ext uri="{FF2B5EF4-FFF2-40B4-BE49-F238E27FC236}">
+                <a16:creationId xmlns:a16="http://schemas.microsoft.com/office/drawing/2014/main" id="{3D51FBFB-E386-428D-AE75-A92AF86CEAEB}"/>
+              </a:ext>
+            </a:extLst>
+          </p:cNvPr>
+          <p:cNvSpPr>
+            <a:spLocks noGrp="1"/>
+          </p:cNvSpPr>
+          <p:nvPr>
+            <p:ph type="subTitle" idx="1"/>
+          </p:nvPr>
+        </p:nvSpPr>
+        <p:spPr/>
+        <p:txBody>
+          <a:bodyPr/>
+          <a:lstStyle/>
+          <a:p>
+            <a:endParaRPr lang="ru-RU"/>
+          </a:p>
+        </p:txBody>
+      </p:sp>
+    </p:spTree>
+    <p:extLst>
+      <p:ext uri="{BB962C8B-B14F-4D97-AF65-F5344CB8AC3E}">
+        <p14:creationId xmlns:p14="http://schemas.microsoft.com/office/powerpoint/2010/main" val="1508207953"/>
+      </p:ext>
+    </p:extLst>
+  </p:cSld>
+  <p:clrMapOvr>
+    <a:masterClrMapping/>
+  </p:clrMapOvr>
+</p:sld>
+</file>
+
+<file path=ppt/slides/slide4.xml><?xml version="1.0" encoding="utf-8"?>
+<p:sld xmlns:a="http://schemas.openxmlformats.org/drawingml/2006/main" xmlns:r="http://schemas.openxmlformats.org/officeDocument/2006/relationships" xmlns:p="http://schemas.openxmlformats.org/presentationml/2006/main">
+  <p:cSld>
+    <p:spTree>
+      <p:nvGrpSpPr>
+        <p:cNvPr id="1" name=""/>
+        <p:cNvGrpSpPr/>
+        <p:nvPr/>
+      </p:nvGrpSpPr>
+      <p:grpSpPr>
+        <a:xfrm>
+          <a:off x="0" y="0"/>
+          <a:ext cx="0" cy="0"/>
+          <a:chOff x="0" y="0"/>
+          <a:chExt cx="0" cy="0"/>
+        </a:xfrm>
+      </p:grpSpPr>
+      <p:sp>
+        <p:nvSpPr>
+          <p:cNvPr id="2" name="Заголовок 1">
+            <a:extLst>
+              <a:ext uri="{FF2B5EF4-FFF2-40B4-BE49-F238E27FC236}">
+                <a16:creationId xmlns:a16="http://schemas.microsoft.com/office/drawing/2014/main" id="{1F591583-A9B1-449C-A887-12D95D80C176}"/>
+              </a:ext>
+            </a:extLst>
+          </p:cNvPr>
+          <p:cNvSpPr>
+            <a:spLocks noGrp="1"/>
+          </p:cNvSpPr>
+          <p:nvPr>
+            <p:ph type="title"/>
+          </p:nvPr>
+        </p:nvSpPr>
+        <p:spPr/>
+        <p:txBody>
+          <a:bodyPr/>
+          <a:lstStyle/>
+          <a:p>
+            <a:r>
+              <a:rPr lang="en-US" dirty="0"/>
+              <a:t>Windows Forms</a:t>
+            </a:r>
+            <a:endParaRPr lang="ru-RU" dirty="0"/>
+          </a:p>
+        </p:txBody>
+      </p:sp>
+      <p:sp>
+        <p:nvSpPr>
+          <p:cNvPr id="3" name="Объект 2">
+            <a:extLst>
+              <a:ext uri="{FF2B5EF4-FFF2-40B4-BE49-F238E27FC236}">
+                <a16:creationId xmlns:a16="http://schemas.microsoft.com/office/drawing/2014/main" id="{23A8B676-83A9-4C4E-946E-43CE7DCAF09A}"/>
+              </a:ext>
+            </a:extLst>
+          </p:cNvPr>
+          <p:cNvSpPr>
+            <a:spLocks noGrp="1"/>
+          </p:cNvSpPr>
+          <p:nvPr>
+            <p:ph idx="1"/>
+          </p:nvPr>
+        </p:nvSpPr>
+        <p:spPr/>
+        <p:txBody>
+          <a:bodyPr/>
+          <a:lstStyle/>
+          <a:p>
+            <a:r>
+              <a:rPr lang="uk-UA" dirty="0"/>
+              <a:t>Переваги:</a:t>
+            </a:r>
+          </a:p>
+          <a:p>
+            <a:pPr lvl="1"/>
+            <a:r>
+              <a:rPr lang="uk-UA" dirty="0"/>
+              <a:t>Простота розробки</a:t>
+            </a:r>
+          </a:p>
+          <a:p>
+            <a:pPr lvl="1"/>
+            <a:r>
+              <a:rPr lang="uk-UA" dirty="0"/>
+              <a:t>Убудованість у </a:t>
+            </a:r>
+            <a:r>
+              <a:rPr lang="en-US" dirty="0"/>
+              <a:t>Visual Studio IDE</a:t>
+            </a:r>
+          </a:p>
+          <a:p>
+            <a:pPr lvl="1"/>
+            <a:r>
+              <a:rPr lang="uk-UA" dirty="0"/>
+              <a:t>Вбудований</a:t>
+            </a:r>
+            <a:r>
+              <a:rPr lang="ru-RU" dirty="0"/>
+              <a:t> редактор форм</a:t>
+            </a:r>
+            <a:br>
+              <a:rPr lang="ru-RU" dirty="0"/>
+            </a:br>
+            <a:endParaRPr lang="uk-UA" dirty="0"/>
+          </a:p>
+          <a:p>
+            <a:r>
+              <a:rPr lang="uk-UA" dirty="0"/>
+              <a:t>Недоліки:</a:t>
+            </a:r>
+          </a:p>
+          <a:p>
+            <a:pPr lvl="1"/>
+            <a:r>
+              <a:rPr lang="uk-UA" dirty="0"/>
+              <a:t>Застарілість</a:t>
+            </a:r>
+          </a:p>
+          <a:p>
+            <a:pPr lvl="1"/>
+            <a:r>
+              <a:rPr lang="uk-UA" dirty="0"/>
+              <a:t>Обмеженість</a:t>
+            </a:r>
+            <a:endParaRPr lang="ru-RU" dirty="0"/>
+          </a:p>
+        </p:txBody>
+      </p:sp>
+    </p:spTree>
+    <p:extLst>
+      <p:ext uri="{BB962C8B-B14F-4D97-AF65-F5344CB8AC3E}">
+        <p14:creationId xmlns:p14="http://schemas.microsoft.com/office/powerpoint/2010/main" val="2809470715"/>
+      </p:ext>
+    </p:extLst>
+  </p:cSld>
+  <p:clrMapOvr>
+    <a:masterClrMapping/>
+  </p:clrMapOvr>
+</p:sld>
+</file>
+
+<file path=ppt/slides/slide5.xml><?xml version="1.0" encoding="utf-8"?>
+<p:sld xmlns:a="http://schemas.openxmlformats.org/drawingml/2006/main" xmlns:r="http://schemas.openxmlformats.org/officeDocument/2006/relationships" xmlns:p="http://schemas.openxmlformats.org/presentationml/2006/main">
+  <p:cSld>
+    <p:spTree>
+      <p:nvGrpSpPr>
+        <p:cNvPr id="1" name=""/>
+        <p:cNvGrpSpPr/>
+        <p:nvPr/>
+      </p:nvGrpSpPr>
+      <p:grpSpPr>
+        <a:xfrm>
+          <a:off x="0" y="0"/>
+          <a:ext cx="0" cy="0"/>
+          <a:chOff x="0" y="0"/>
+          <a:chExt cx="0" cy="0"/>
+        </a:xfrm>
+      </p:grpSpPr>
+      <p:sp>
+        <p:nvSpPr>
+          <p:cNvPr id="2" name="Заголовок 1">
+            <a:extLst>
+              <a:ext uri="{FF2B5EF4-FFF2-40B4-BE49-F238E27FC236}">
+                <a16:creationId xmlns:a16="http://schemas.microsoft.com/office/drawing/2014/main" id="{C554F695-0338-4BA8-9002-C358212814A1}"/>
+              </a:ext>
+            </a:extLst>
+          </p:cNvPr>
+          <p:cNvSpPr>
+            <a:spLocks noGrp="1"/>
+          </p:cNvSpPr>
+          <p:nvPr>
+            <p:ph type="title"/>
+          </p:nvPr>
+        </p:nvSpPr>
+        <p:spPr/>
+        <p:txBody>
+          <a:bodyPr/>
+          <a:lstStyle/>
+          <a:p>
+            <a:r>
+              <a:rPr lang="en-US" dirty="0"/>
+              <a:t>JUCE</a:t>
+            </a:r>
+            <a:endParaRPr lang="ru-RU" dirty="0"/>
+          </a:p>
+        </p:txBody>
+      </p:sp>
+      <p:sp>
+        <p:nvSpPr>
+          <p:cNvPr id="3" name="Объект 2">
+            <a:extLst>
+              <a:ext uri="{FF2B5EF4-FFF2-40B4-BE49-F238E27FC236}">
+                <a16:creationId xmlns:a16="http://schemas.microsoft.com/office/drawing/2014/main" id="{DA2BCD82-AD72-4DCF-89F5-9B6A75200A91}"/>
+              </a:ext>
+            </a:extLst>
+          </p:cNvPr>
+          <p:cNvSpPr>
+            <a:spLocks noGrp="1"/>
+          </p:cNvSpPr>
+          <p:nvPr>
+            <p:ph idx="1"/>
+          </p:nvPr>
+        </p:nvSpPr>
+        <p:spPr/>
+        <p:txBody>
+          <a:bodyPr/>
+          <a:lstStyle/>
+          <a:p>
+            <a:r>
+              <a:rPr lang="uk-UA" dirty="0"/>
+              <a:t>Переваги:</a:t>
+            </a:r>
+          </a:p>
+          <a:p>
+            <a:pPr lvl="1"/>
+            <a:br>
+              <a:rPr lang="uk-UA" dirty="0"/>
+            </a:br>
+            <a:endParaRPr lang="uk-UA" dirty="0"/>
+          </a:p>
+          <a:p>
+            <a:r>
+              <a:rPr lang="uk-UA" dirty="0"/>
+              <a:t>Недоліки:</a:t>
+            </a:r>
+          </a:p>
+          <a:p>
+            <a:pPr lvl="1"/>
+            <a:r>
+              <a:rPr lang="uk-UA" dirty="0"/>
+              <a:t>Відсутність вбудованого редактору форм</a:t>
+            </a:r>
+          </a:p>
+          <a:p>
+            <a:pPr lvl="1"/>
+            <a:r>
+              <a:rPr lang="uk-UA" dirty="0"/>
+              <a:t>Низька швидкість </a:t>
+            </a:r>
+            <a:endParaRPr lang="ru-RU" dirty="0"/>
+          </a:p>
+        </p:txBody>
+      </p:sp>
+      <p:pic>
+        <p:nvPicPr>
+          <p:cNvPr id="4" name="Picture 2" descr="Image result for JUCE">
+            <a:extLst>
+              <a:ext uri="{FF2B5EF4-FFF2-40B4-BE49-F238E27FC236}">
+                <a16:creationId xmlns:a16="http://schemas.microsoft.com/office/drawing/2014/main" id="{41434905-48E7-464C-BA20-50538369B894}"/>
+              </a:ext>
+            </a:extLst>
+          </p:cNvPr>
+          <p:cNvPicPr>
+            <a:picLocks noChangeAspect="1" noChangeArrowheads="1"/>
+          </p:cNvPicPr>
+          <p:nvPr/>
+        </p:nvPicPr>
+        <p:blipFill>
+          <a:blip r:embed="rId2">
+            <a:extLst>
+              <a:ext uri="{28A0092B-C50C-407E-A947-70E740481C1C}">
+                <a14:useLocalDpi xmlns:a14="http://schemas.microsoft.com/office/drawing/2010/main" val="0"/>
+              </a:ext>
+            </a:extLst>
+          </a:blip>
+          <a:srcRect/>
+          <a:stretch>
+            <a:fillRect/>
+          </a:stretch>
+        </p:blipFill>
+        <p:spPr bwMode="auto">
+          <a:xfrm>
+            <a:off x="4691426" y="816638"/>
+            <a:ext cx="4582576" cy="1753033"/>
+          </a:xfrm>
+          <a:prstGeom prst="rect">
+            <a:avLst/>
+          </a:prstGeom>
+          <a:noFill/>
+          <a:extLst>
+            <a:ext uri="{909E8E84-426E-40DD-AFC4-6F175D3DCCD1}">
+              <a14:hiddenFill xmlns:a14="http://schemas.microsoft.com/office/drawing/2010/main">
+                <a:solidFill>
+                  <a:srgbClr val="FFFFFF"/>
+                </a:solidFill>
+              </a14:hiddenFill>
+            </a:ext>
+          </a:extLst>
+        </p:spPr>
+      </p:pic>
+    </p:spTree>
+    <p:extLst>
+      <p:ext uri="{BB962C8B-B14F-4D97-AF65-F5344CB8AC3E}">
+        <p14:creationId xmlns:p14="http://schemas.microsoft.com/office/powerpoint/2010/main" val="2375175998"/>
+      </p:ext>
+    </p:extLst>
+  </p:cSld>
+  <p:clrMapOvr>
+    <a:masterClrMapping/>
+  </p:clrMapOvr>
+</p:sld>
+</file>
+
+<file path=ppt/slides/slide6.xml><?xml version="1.0" encoding="utf-8"?>
+<p:sld xmlns:a="http://schemas.openxmlformats.org/drawingml/2006/main" xmlns:r="http://schemas.openxmlformats.org/officeDocument/2006/relationships" xmlns:p="http://schemas.openxmlformats.org/presentationml/2006/main">
+  <p:cSld>
+    <p:spTree>
+      <p:nvGrpSpPr>
+        <p:cNvPr id="1" name=""/>
+        <p:cNvGrpSpPr/>
+        <p:nvPr/>
+      </p:nvGrpSpPr>
+      <p:grpSpPr>
+        <a:xfrm>
+          <a:off x="0" y="0"/>
+          <a:ext cx="0" cy="0"/>
+          <a:chOff x="0" y="0"/>
+          <a:chExt cx="0" cy="0"/>
+        </a:xfrm>
+      </p:grpSpPr>
+      <p:sp>
+        <p:nvSpPr>
+          <p:cNvPr id="2" name="Заголовок 1">
+            <a:extLst>
+              <a:ext uri="{FF2B5EF4-FFF2-40B4-BE49-F238E27FC236}">
+                <a16:creationId xmlns:a16="http://schemas.microsoft.com/office/drawing/2014/main" id="{847346F7-B7C2-496B-89CA-89BD4BEDCBEE}"/>
+              </a:ext>
+            </a:extLst>
+          </p:cNvPr>
+          <p:cNvSpPr>
+            <a:spLocks noGrp="1"/>
+          </p:cNvSpPr>
+          <p:nvPr>
+            <p:ph type="title"/>
+          </p:nvPr>
+        </p:nvSpPr>
+        <p:spPr/>
+        <p:txBody>
+          <a:bodyPr/>
+          <a:lstStyle/>
+          <a:p>
+            <a:r>
+              <a:rPr lang="en-US" dirty="0"/>
+              <a:t>QT</a:t>
+            </a:r>
+            <a:endParaRPr lang="ru-RU" dirty="0"/>
+          </a:p>
+        </p:txBody>
+      </p:sp>
+      <p:sp>
+        <p:nvSpPr>
+          <p:cNvPr id="3" name="Объект 2">
+            <a:extLst>
+              <a:ext uri="{FF2B5EF4-FFF2-40B4-BE49-F238E27FC236}">
+                <a16:creationId xmlns:a16="http://schemas.microsoft.com/office/drawing/2014/main" id="{1C7D3D54-C2B8-4096-832E-7E74570C280E}"/>
+              </a:ext>
+            </a:extLst>
+          </p:cNvPr>
+          <p:cNvSpPr>
+            <a:spLocks noGrp="1"/>
+          </p:cNvSpPr>
+          <p:nvPr>
+            <p:ph idx="1"/>
+          </p:nvPr>
+        </p:nvSpPr>
+        <p:spPr/>
+        <p:txBody>
+          <a:bodyPr/>
+          <a:lstStyle/>
+          <a:p>
+            <a:r>
+              <a:rPr lang="uk-UA" dirty="0"/>
+              <a:t>Переваги:</a:t>
+            </a:r>
+          </a:p>
+          <a:p>
+            <a:pPr lvl="1"/>
+            <a:r>
+              <a:rPr lang="uk-UA" dirty="0"/>
+              <a:t>Гнучкість</a:t>
+            </a:r>
+          </a:p>
+          <a:p>
+            <a:pPr lvl="1"/>
+            <a:r>
+              <a:rPr lang="uk-UA" dirty="0"/>
+              <a:t>Вбудований дизайнер форм</a:t>
+            </a:r>
+            <a:br>
+              <a:rPr lang="uk-UA" dirty="0"/>
+            </a:br>
+            <a:endParaRPr lang="uk-UA" dirty="0"/>
+          </a:p>
+          <a:p>
+            <a:r>
+              <a:rPr lang="uk-UA" dirty="0"/>
+              <a:t>Недоліки:</a:t>
+            </a:r>
+          </a:p>
+          <a:p>
+            <a:pPr lvl="1"/>
+            <a:r>
+              <a:rPr lang="uk-UA" dirty="0"/>
+              <a:t>Складність</a:t>
+            </a:r>
+          </a:p>
+          <a:p>
+            <a:pPr lvl="1"/>
+            <a:endParaRPr lang="uk-UA" dirty="0"/>
+          </a:p>
+        </p:txBody>
+      </p:sp>
+      <p:pic>
+        <p:nvPicPr>
+          <p:cNvPr id="4" name="Picture 4" descr="Image result for qt">
+            <a:extLst>
+              <a:ext uri="{FF2B5EF4-FFF2-40B4-BE49-F238E27FC236}">
+                <a16:creationId xmlns:a16="http://schemas.microsoft.com/office/drawing/2014/main" id="{69054543-5FE5-4583-A800-21343A8870AF}"/>
+              </a:ext>
+            </a:extLst>
+          </p:cNvPr>
+          <p:cNvPicPr>
+            <a:picLocks noChangeAspect="1" noChangeArrowheads="1"/>
+          </p:cNvPicPr>
+          <p:nvPr/>
+        </p:nvPicPr>
+        <p:blipFill>
+          <a:blip r:embed="rId2">
+            <a:extLst>
+              <a:ext uri="{28A0092B-C50C-407E-A947-70E740481C1C}">
+                <a14:useLocalDpi xmlns:a14="http://schemas.microsoft.com/office/drawing/2010/main" val="0"/>
+              </a:ext>
+            </a:extLst>
+          </a:blip>
+          <a:srcRect/>
+          <a:stretch>
+            <a:fillRect/>
+          </a:stretch>
+        </p:blipFill>
+        <p:spPr bwMode="auto">
+          <a:xfrm>
+            <a:off x="5952638" y="609600"/>
+            <a:ext cx="3321364" cy="2435629"/>
+          </a:xfrm>
+          <a:prstGeom prst="rect">
+            <a:avLst/>
+          </a:prstGeom>
+          <a:noFill/>
+          <a:extLst>
+            <a:ext uri="{909E8E84-426E-40DD-AFC4-6F175D3DCCD1}">
+              <a14:hiddenFill xmlns:a14="http://schemas.microsoft.com/office/drawing/2010/main">
+                <a:solidFill>
+                  <a:srgbClr val="FFFFFF"/>
+                </a:solidFill>
+              </a14:hiddenFill>
+            </a:ext>
+          </a:extLst>
+        </p:spPr>
+      </p:pic>
+    </p:spTree>
+    <p:extLst>
+      <p:ext uri="{BB962C8B-B14F-4D97-AF65-F5344CB8AC3E}">
+        <p14:creationId xmlns:p14="http://schemas.microsoft.com/office/powerpoint/2010/main" val="3754442097"/>
+      </p:ext>
+    </p:extLst>
+  </p:cSld>
+  <p:clrMapOvr>
+    <a:masterClrMapping/>
+  </p:clrMapOvr>
+</p:sld>
+</file>
+
+<file path=ppt/slides/slide7.xml><?xml version="1.0" encoding="utf-8"?>
+<p:sld xmlns:a="http://schemas.openxmlformats.org/drawingml/2006/main" xmlns:r="http://schemas.openxmlformats.org/officeDocument/2006/relationships" xmlns:p="http://schemas.openxmlformats.org/presentationml/2006/main">
+  <p:cSld>
+    <p:spTree>
+      <p:nvGrpSpPr>
+        <p:cNvPr id="1" name=""/>
+        <p:cNvGrpSpPr/>
+        <p:nvPr/>
+      </p:nvGrpSpPr>
+      <p:grpSpPr>
+        <a:xfrm>
+          <a:off x="0" y="0"/>
+          <a:ext cx="0" cy="0"/>
+          <a:chOff x="0" y="0"/>
+          <a:chExt cx="0" cy="0"/>
+        </a:xfrm>
+      </p:grpSpPr>
+      <p:sp>
+        <p:nvSpPr>
+          <p:cNvPr id="2" name="Заголовок 1">
+            <a:extLst>
+              <a:ext uri="{FF2B5EF4-FFF2-40B4-BE49-F238E27FC236}">
+                <a16:creationId xmlns:a16="http://schemas.microsoft.com/office/drawing/2014/main" id="{A3ADA424-F931-4515-A9EF-C7997798AB88}"/>
+              </a:ext>
+            </a:extLst>
+          </p:cNvPr>
+          <p:cNvSpPr>
+            <a:spLocks noGrp="1"/>
+          </p:cNvSpPr>
+          <p:nvPr>
+            <p:ph type="ctrTitle"/>
+          </p:nvPr>
+        </p:nvSpPr>
+        <p:spPr/>
+        <p:txBody>
+          <a:bodyPr/>
+          <a:lstStyle/>
+          <a:p>
+            <a:r>
+              <a:rPr lang="uk-UA" dirty="0"/>
+              <a:t>Хід розробки</a:t>
+            </a:r>
+            <a:endParaRPr lang="ru-RU" dirty="0"/>
+          </a:p>
+        </p:txBody>
+      </p:sp>
+      <p:sp>
+        <p:nvSpPr>
+          <p:cNvPr id="3" name="Подзаголовок 2">
+            <a:extLst>
+              <a:ext uri="{FF2B5EF4-FFF2-40B4-BE49-F238E27FC236}">
+                <a16:creationId xmlns:a16="http://schemas.microsoft.com/office/drawing/2014/main" id="{7F6101D8-33E5-497A-981D-CBAEA5E2031F}"/>
+              </a:ext>
+            </a:extLst>
+          </p:cNvPr>
+          <p:cNvSpPr>
+            <a:spLocks noGrp="1"/>
+          </p:cNvSpPr>
+          <p:nvPr>
+            <p:ph type="subTitle" idx="1"/>
+          </p:nvPr>
+        </p:nvSpPr>
+        <p:spPr/>
+        <p:txBody>
+          <a:bodyPr/>
+          <a:lstStyle/>
+          <a:p>
+            <a:endParaRPr lang="ru-RU"/>
+          </a:p>
+        </p:txBody>
+      </p:sp>
+    </p:spTree>
+    <p:extLst>
+      <p:ext uri="{BB962C8B-B14F-4D97-AF65-F5344CB8AC3E}">
+        <p14:creationId xmlns:p14="http://schemas.microsoft.com/office/powerpoint/2010/main" val="151012432"/>
+      </p:ext>
+    </p:extLst>
+  </p:cSld>
+  <p:clrMapOvr>
+    <a:masterClrMapping/>
+  </p:clrMapOvr>
+</p:sld>
+</file>
+
+<file path=ppt/slides/slide8.xml><?xml version="1.0" encoding="utf-8"?>
+<p:sld xmlns:a="http://schemas.openxmlformats.org/drawingml/2006/main" xmlns:r="http://schemas.openxmlformats.org/officeDocument/2006/relationships" xmlns:p="http://schemas.openxmlformats.org/presentationml/2006/main">
+  <p:cSld>
+    <p:spTree>
+      <p:nvGrpSpPr>
+        <p:cNvPr id="1" name=""/>
+        <p:cNvGrpSpPr/>
+        <p:nvPr/>
+      </p:nvGrpSpPr>
+      <p:grpSpPr>
+        <a:xfrm>
+          <a:off x="0" y="0"/>
+          <a:ext cx="0" cy="0"/>
+          <a:chOff x="0" y="0"/>
+          <a:chExt cx="0" cy="0"/>
+        </a:xfrm>
+      </p:grpSpPr>
+      <p:sp>
+        <p:nvSpPr>
+          <p:cNvPr id="2" name="Заголовок 1">
+            <a:extLst>
+              <a:ext uri="{FF2B5EF4-FFF2-40B4-BE49-F238E27FC236}">
+                <a16:creationId xmlns:a16="http://schemas.microsoft.com/office/drawing/2014/main" id="{724DA49A-87A5-4357-A780-A04098F3DEEA}"/>
+              </a:ext>
+            </a:extLst>
+          </p:cNvPr>
+          <p:cNvSpPr>
+            <a:spLocks noGrp="1"/>
+          </p:cNvSpPr>
+          <p:nvPr>
+            <p:ph type="title"/>
+          </p:nvPr>
+        </p:nvSpPr>
+        <p:spPr/>
+        <p:txBody>
+          <a:bodyPr/>
+          <a:lstStyle/>
+          <a:p>
+            <a:r>
+              <a:rPr lang="uk-UA" dirty="0"/>
+              <a:t>Використання </a:t>
+            </a:r>
+            <a:r>
+              <a:rPr lang="en-US" dirty="0"/>
+              <a:t>Windows API</a:t>
+            </a:r>
+            <a:endParaRPr lang="ru-RU" dirty="0"/>
+          </a:p>
+        </p:txBody>
+      </p:sp>
+      <p:sp>
+        <p:nvSpPr>
+          <p:cNvPr id="3" name="Объект 2">
+            <a:extLst>
+              <a:ext uri="{FF2B5EF4-FFF2-40B4-BE49-F238E27FC236}">
+                <a16:creationId xmlns:a16="http://schemas.microsoft.com/office/drawing/2014/main" id="{D704EBCE-B827-4585-BB40-A040858FC07C}"/>
+              </a:ext>
+            </a:extLst>
+          </p:cNvPr>
+          <p:cNvSpPr>
+            <a:spLocks noGrp="1"/>
+          </p:cNvSpPr>
+          <p:nvPr>
+            <p:ph idx="1"/>
+          </p:nvPr>
+        </p:nvSpPr>
+        <p:spPr/>
+        <p:txBody>
+          <a:bodyPr/>
+          <a:lstStyle/>
+          <a:p>
+            <a:endParaRPr lang="ru-RU"/>
+          </a:p>
+        </p:txBody>
+      </p:sp>
+    </p:spTree>
+    <p:extLst>
+      <p:ext uri="{BB962C8B-B14F-4D97-AF65-F5344CB8AC3E}">
+        <p14:creationId xmlns:p14="http://schemas.microsoft.com/office/powerpoint/2010/main" val="4271271887"/>
+      </p:ext>
+    </p:extLst>
+  </p:cSld>
+  <p:clrMapOvr>
+    <a:masterClrMapping/>
+  </p:clrMapOvr>
+</p:sld>
+</file>
+
 <file path=ppt/theme/theme1.xml><?xml version="1.0" encoding="utf-8"?>
 <a:theme xmlns:a="http://schemas.openxmlformats.org/drawingml/2006/main" name="Аспект">
   <a:themeElements>

</xml_diff>

<commit_message>
Work on the ppt 1
</commit_message>
<xml_diff>
--- a/Курсова робота на тему.pptx
+++ b/Курсова робота на тему.pptx
@@ -7,12 +7,15 @@
   <p:sldIdLst>
     <p:sldId id="256" r:id="rId2"/>
     <p:sldId id="257" r:id="rId3"/>
-    <p:sldId id="260" r:id="rId4"/>
-    <p:sldId id="261" r:id="rId5"/>
-    <p:sldId id="262" r:id="rId6"/>
-    <p:sldId id="263" r:id="rId7"/>
-    <p:sldId id="264" r:id="rId8"/>
-    <p:sldId id="265" r:id="rId9"/>
+    <p:sldId id="266" r:id="rId4"/>
+    <p:sldId id="260" r:id="rId5"/>
+    <p:sldId id="261" r:id="rId6"/>
+    <p:sldId id="262" r:id="rId7"/>
+    <p:sldId id="263" r:id="rId8"/>
+    <p:sldId id="264" r:id="rId9"/>
+    <p:sldId id="265" r:id="rId10"/>
+    <p:sldId id="267" r:id="rId11"/>
+    <p:sldId id="268" r:id="rId12"/>
   </p:sldIdLst>
   <p:sldSz cx="12192000" cy="6858000"/>
   <p:notesSz cx="6858000" cy="9144000"/>
@@ -111,6 +114,11 @@
       </a:defRPr>
     </a:lvl9pPr>
   </p:defaultTextStyle>
+  <p:extLst>
+    <p:ext uri="{EFAFB233-063F-42B5-8137-9DF3F51BA10A}">
+      <p15:sldGuideLst xmlns:p15="http://schemas.microsoft.com/office/powerpoint/2012/main"/>
+    </p:ext>
+  </p:extLst>
 </p:presentation>
 </file>
 
@@ -837,7 +845,7 @@
             <a:fld id="{B61BEF0D-F0BB-DE4B-95CE-6DB70DBA9567}" type="datetimeFigureOut">
               <a:rPr lang="en-US" dirty="0"/>
               <a:pPr/>
-              <a:t>6/17/2019</a:t>
+              <a:t>6/20/2019</a:t>
             </a:fld>
             <a:endParaRPr lang="en-US" dirty="0"/>
           </a:p>
@@ -1085,7 +1093,7 @@
             <a:fld id="{B61BEF0D-F0BB-DE4B-95CE-6DB70DBA9567}" type="datetimeFigureOut">
               <a:rPr lang="en-US" dirty="0"/>
               <a:pPr/>
-              <a:t>6/17/2019</a:t>
+              <a:t>6/20/2019</a:t>
             </a:fld>
             <a:endParaRPr lang="en-US" dirty="0"/>
           </a:p>
@@ -1396,7 +1404,7 @@
             <a:fld id="{B61BEF0D-F0BB-DE4B-95CE-6DB70DBA9567}" type="datetimeFigureOut">
               <a:rPr lang="en-US" dirty="0"/>
               <a:pPr/>
-              <a:t>6/17/2019</a:t>
+              <a:t>6/20/2019</a:t>
             </a:fld>
             <a:endParaRPr lang="en-US" dirty="0"/>
           </a:p>
@@ -1734,7 +1742,7 @@
             <a:fld id="{B61BEF0D-F0BB-DE4B-95CE-6DB70DBA9567}" type="datetimeFigureOut">
               <a:rPr lang="en-US" dirty="0"/>
               <a:pPr/>
-              <a:t>6/17/2019</a:t>
+              <a:t>6/20/2019</a:t>
             </a:fld>
             <a:endParaRPr lang="en-US" dirty="0"/>
           </a:p>
@@ -2045,7 +2053,7 @@
             <a:fld id="{B61BEF0D-F0BB-DE4B-95CE-6DB70DBA9567}" type="datetimeFigureOut">
               <a:rPr lang="en-US" dirty="0"/>
               <a:pPr/>
-              <a:t>6/17/2019</a:t>
+              <a:t>6/20/2019</a:t>
             </a:fld>
             <a:endParaRPr lang="en-US" dirty="0"/>
           </a:p>
@@ -2435,7 +2443,7 @@
             <a:fld id="{B61BEF0D-F0BB-DE4B-95CE-6DB70DBA9567}" type="datetimeFigureOut">
               <a:rPr lang="en-US" dirty="0"/>
               <a:pPr/>
-              <a:t>6/17/2019</a:t>
+              <a:t>6/20/2019</a:t>
             </a:fld>
             <a:endParaRPr lang="en-US" dirty="0"/>
           </a:p>
@@ -2601,7 +2609,7 @@
           <a:p>
             <a:fld id="{55C6B4A9-1611-4792-9094-5F34BCA07E0B}" type="datetimeFigureOut">
               <a:rPr lang="en-US" dirty="0"/>
-              <a:t>6/17/2019</a:t>
+              <a:t>6/20/2019</a:t>
             </a:fld>
             <a:endParaRPr lang="en-US" dirty="0"/>
           </a:p>
@@ -2777,7 +2785,7 @@
             <a:fld id="{B61BEF0D-F0BB-DE4B-95CE-6DB70DBA9567}" type="datetimeFigureOut">
               <a:rPr lang="en-US" dirty="0"/>
               <a:pPr/>
-              <a:t>6/17/2019</a:t>
+              <a:t>6/20/2019</a:t>
             </a:fld>
             <a:endParaRPr lang="en-US" dirty="0"/>
           </a:p>
@@ -2950,7 +2958,7 @@
             <a:fld id="{B61BEF0D-F0BB-DE4B-95CE-6DB70DBA9567}" type="datetimeFigureOut">
               <a:rPr lang="en-US" dirty="0"/>
               <a:pPr/>
-              <a:t>6/17/2019</a:t>
+              <a:t>6/20/2019</a:t>
             </a:fld>
             <a:endParaRPr lang="en-US" dirty="0"/>
           </a:p>
@@ -3194,7 +3202,7 @@
             <a:fld id="{B61BEF0D-F0BB-DE4B-95CE-6DB70DBA9567}" type="datetimeFigureOut">
               <a:rPr lang="en-US" dirty="0"/>
               <a:pPr/>
-              <a:t>6/17/2019</a:t>
+              <a:t>6/20/2019</a:t>
             </a:fld>
             <a:endParaRPr lang="en-US" dirty="0"/>
           </a:p>
@@ -3422,7 +3430,7 @@
           <a:p>
             <a:fld id="{EB712588-04B1-427B-82EE-E8DB90309F08}" type="datetimeFigureOut">
               <a:rPr lang="en-US" dirty="0"/>
-              <a:t>6/17/2019</a:t>
+              <a:t>6/20/2019</a:t>
             </a:fld>
             <a:endParaRPr lang="en-US" dirty="0"/>
           </a:p>
@@ -3792,7 +3800,7 @@
             <a:fld id="{B61BEF0D-F0BB-DE4B-95CE-6DB70DBA9567}" type="datetimeFigureOut">
               <a:rPr lang="en-US" dirty="0"/>
               <a:pPr/>
-              <a:t>6/17/2019</a:t>
+              <a:t>6/20/2019</a:t>
             </a:fld>
             <a:endParaRPr lang="en-US" dirty="0"/>
           </a:p>
@@ -3912,7 +3920,7 @@
             <a:fld id="{B61BEF0D-F0BB-DE4B-95CE-6DB70DBA9567}" type="datetimeFigureOut">
               <a:rPr lang="en-US" dirty="0"/>
               <a:pPr/>
-              <a:t>6/17/2019</a:t>
+              <a:t>6/20/2019</a:t>
             </a:fld>
             <a:endParaRPr lang="en-US" dirty="0"/>
           </a:p>
@@ -4004,7 +4012,7 @@
             <a:fld id="{B61BEF0D-F0BB-DE4B-95CE-6DB70DBA9567}" type="datetimeFigureOut">
               <a:rPr lang="en-US" dirty="0"/>
               <a:pPr/>
-              <a:t>6/17/2019</a:t>
+              <a:t>6/20/2019</a:t>
             </a:fld>
             <a:endParaRPr lang="en-US" dirty="0"/>
           </a:p>
@@ -4255,7 +4263,7 @@
           <a:p>
             <a:fld id="{42A54C80-263E-416B-A8E0-580EDEADCBDC}" type="datetimeFigureOut">
               <a:rPr lang="en-US" dirty="0"/>
-              <a:t>6/17/2019</a:t>
+              <a:t>6/20/2019</a:t>
             </a:fld>
             <a:endParaRPr lang="en-US" dirty="0"/>
           </a:p>
@@ -4422,7 +4430,7 @@
           </a:lstStyle>
           <a:p>
             <a:r>
-              <a:rPr lang="ru-RU"/>
+              <a:rPr lang="ru-RU" dirty="0"/>
               <a:t>Вставка рисунка</a:t>
             </a:r>
             <a:endParaRPr lang="en-US" dirty="0"/>
@@ -4514,7 +4522,7 @@
             <a:fld id="{B61BEF0D-F0BB-DE4B-95CE-6DB70DBA9567}" type="datetimeFigureOut">
               <a:rPr lang="en-US" dirty="0"/>
               <a:pPr/>
-              <a:t>6/17/2019</a:t>
+              <a:t>6/20/2019</a:t>
             </a:fld>
             <a:endParaRPr lang="en-US" dirty="0"/>
           </a:p>
@@ -5254,7 +5262,7 @@
             <a:fld id="{B61BEF0D-F0BB-DE4B-95CE-6DB70DBA9567}" type="datetimeFigureOut">
               <a:rPr lang="en-US" dirty="0"/>
               <a:pPr/>
-              <a:t>6/17/2019</a:t>
+              <a:t>6/20/2019</a:t>
             </a:fld>
             <a:endParaRPr lang="en-US" dirty="0"/>
           </a:p>
@@ -5867,6 +5875,232 @@
 </p:sld>
 </file>
 
+<file path=ppt/slides/slide10.xml><?xml version="1.0" encoding="utf-8"?>
+<p:sld xmlns:a="http://schemas.openxmlformats.org/drawingml/2006/main" xmlns:r="http://schemas.openxmlformats.org/officeDocument/2006/relationships" xmlns:p="http://schemas.openxmlformats.org/presentationml/2006/main">
+  <p:cSld>
+    <p:spTree>
+      <p:nvGrpSpPr>
+        <p:cNvPr id="1" name=""/>
+        <p:cNvGrpSpPr/>
+        <p:nvPr/>
+      </p:nvGrpSpPr>
+      <p:grpSpPr>
+        <a:xfrm>
+          <a:off x="0" y="0"/>
+          <a:ext cx="0" cy="0"/>
+          <a:chOff x="0" y="0"/>
+          <a:chExt cx="0" cy="0"/>
+        </a:xfrm>
+      </p:grpSpPr>
+      <p:sp>
+        <p:nvSpPr>
+          <p:cNvPr id="2" name="Заголовок 1">
+            <a:extLst>
+              <a:ext uri="{FF2B5EF4-FFF2-40B4-BE49-F238E27FC236}">
+                <a16:creationId xmlns:a16="http://schemas.microsoft.com/office/drawing/2014/main" id="{2FF8E389-F322-4337-A3F0-65A43300C2FA}"/>
+              </a:ext>
+            </a:extLst>
+          </p:cNvPr>
+          <p:cNvSpPr>
+            <a:spLocks noGrp="1"/>
+          </p:cNvSpPr>
+          <p:nvPr>
+            <p:ph type="title"/>
+          </p:nvPr>
+        </p:nvSpPr>
+        <p:spPr/>
+        <p:txBody>
+          <a:bodyPr/>
+          <a:lstStyle/>
+          <a:p>
+            <a:r>
+              <a:rPr lang="uk-UA" dirty="0"/>
+              <a:t>2. Використання </a:t>
+            </a:r>
+            <a:r>
+              <a:rPr lang="en-US" dirty="0"/>
+              <a:t>WMI</a:t>
+            </a:r>
+            <a:endParaRPr lang="ru-RU" dirty="0"/>
+          </a:p>
+        </p:txBody>
+      </p:sp>
+      <p:sp>
+        <p:nvSpPr>
+          <p:cNvPr id="3" name="Объект 2">
+            <a:extLst>
+              <a:ext uri="{FF2B5EF4-FFF2-40B4-BE49-F238E27FC236}">
+                <a16:creationId xmlns:a16="http://schemas.microsoft.com/office/drawing/2014/main" id="{CEE1A871-6B14-4DB5-83D3-5446156BCD90}"/>
+              </a:ext>
+            </a:extLst>
+          </p:cNvPr>
+          <p:cNvSpPr>
+            <a:spLocks noGrp="1"/>
+          </p:cNvSpPr>
+          <p:nvPr>
+            <p:ph idx="1"/>
+          </p:nvPr>
+        </p:nvSpPr>
+        <p:spPr/>
+        <p:txBody>
+          <a:bodyPr/>
+          <a:lstStyle/>
+          <a:p>
+            <a:r>
+              <a:rPr lang="en-US" dirty="0"/>
+              <a:t>Windows Management Instrumentation, </a:t>
+            </a:r>
+            <a:r>
+              <a:rPr lang="uk-UA" dirty="0"/>
+              <a:t>пропоную універсальний спосіб звертання для отримання інформації про різні компоненти системи</a:t>
+            </a:r>
+          </a:p>
+          <a:p>
+            <a:r>
+              <a:rPr lang="uk-UA" dirty="0"/>
+              <a:t>Причина відмови – відсутність сумісності з </a:t>
+            </a:r>
+            <a:r>
+              <a:rPr lang="en-US" dirty="0"/>
+              <a:t>Qt</a:t>
+            </a:r>
+            <a:endParaRPr lang="ru-RU" dirty="0"/>
+          </a:p>
+        </p:txBody>
+      </p:sp>
+    </p:spTree>
+    <p:extLst>
+      <p:ext uri="{BB962C8B-B14F-4D97-AF65-F5344CB8AC3E}">
+        <p14:creationId xmlns:p14="http://schemas.microsoft.com/office/powerpoint/2010/main" val="3302766069"/>
+      </p:ext>
+    </p:extLst>
+  </p:cSld>
+  <p:clrMapOvr>
+    <a:masterClrMapping/>
+  </p:clrMapOvr>
+</p:sld>
+</file>
+
+<file path=ppt/slides/slide11.xml><?xml version="1.0" encoding="utf-8"?>
+<p:sld xmlns:a="http://schemas.openxmlformats.org/drawingml/2006/main" xmlns:r="http://schemas.openxmlformats.org/officeDocument/2006/relationships" xmlns:p="http://schemas.openxmlformats.org/presentationml/2006/main">
+  <p:cSld>
+    <p:spTree>
+      <p:nvGrpSpPr>
+        <p:cNvPr id="1" name=""/>
+        <p:cNvGrpSpPr/>
+        <p:nvPr/>
+      </p:nvGrpSpPr>
+      <p:grpSpPr>
+        <a:xfrm>
+          <a:off x="0" y="0"/>
+          <a:ext cx="0" cy="0"/>
+          <a:chOff x="0" y="0"/>
+          <a:chExt cx="0" cy="0"/>
+        </a:xfrm>
+      </p:grpSpPr>
+      <p:sp>
+        <p:nvSpPr>
+          <p:cNvPr id="2" name="Заголовок 1">
+            <a:extLst>
+              <a:ext uri="{FF2B5EF4-FFF2-40B4-BE49-F238E27FC236}">
+                <a16:creationId xmlns:a16="http://schemas.microsoft.com/office/drawing/2014/main" id="{6FAC47E4-BFE9-4F6E-AFCB-913AF8128214}"/>
+              </a:ext>
+            </a:extLst>
+          </p:cNvPr>
+          <p:cNvSpPr>
+            <a:spLocks noGrp="1"/>
+          </p:cNvSpPr>
+          <p:nvPr>
+            <p:ph type="title"/>
+          </p:nvPr>
+        </p:nvSpPr>
+        <p:spPr/>
+        <p:txBody>
+          <a:bodyPr/>
+          <a:lstStyle/>
+          <a:p>
+            <a:r>
+              <a:rPr lang="uk-UA" u="sng" dirty="0"/>
+              <a:t>3. Комбінований метод</a:t>
+            </a:r>
+            <a:endParaRPr lang="ru-RU" u="sng" dirty="0"/>
+          </a:p>
+        </p:txBody>
+      </p:sp>
+      <p:sp>
+        <p:nvSpPr>
+          <p:cNvPr id="3" name="Объект 2">
+            <a:extLst>
+              <a:ext uri="{FF2B5EF4-FFF2-40B4-BE49-F238E27FC236}">
+                <a16:creationId xmlns:a16="http://schemas.microsoft.com/office/drawing/2014/main" id="{E4A27A83-EF49-4DD5-AD18-A145411A1228}"/>
+              </a:ext>
+            </a:extLst>
+          </p:cNvPr>
+          <p:cNvSpPr>
+            <a:spLocks noGrp="1"/>
+          </p:cNvSpPr>
+          <p:nvPr>
+            <p:ph idx="1"/>
+          </p:nvPr>
+        </p:nvSpPr>
+        <p:spPr/>
+        <p:txBody>
+          <a:bodyPr/>
+          <a:lstStyle/>
+          <a:p>
+            <a:r>
+              <a:rPr lang="uk-UA" dirty="0"/>
+              <a:t>Використання </a:t>
+            </a:r>
+            <a:r>
+              <a:rPr lang="en-US" dirty="0"/>
+              <a:t>CLR (Common Language Runtime) </a:t>
+            </a:r>
+            <a:r>
+              <a:rPr lang="uk-UA" dirty="0"/>
+              <a:t>дає нам змогу використовувати </a:t>
+            </a:r>
+            <a:r>
+              <a:rPr lang="en-US" dirty="0"/>
+              <a:t>.NET</a:t>
+            </a:r>
+            <a:r>
+              <a:rPr lang="uk-UA" dirty="0"/>
+              <a:t> обробник </a:t>
+            </a:r>
+            <a:r>
+              <a:rPr lang="en-US" dirty="0"/>
+              <a:t>WMI</a:t>
+            </a:r>
+            <a:r>
+              <a:rPr lang="uk-UA" dirty="0"/>
+              <a:t>, що у свою чергу є сумісним з </a:t>
+            </a:r>
+            <a:r>
+              <a:rPr lang="en-US" dirty="0"/>
+              <a:t>Qt </a:t>
+            </a:r>
+            <a:r>
+              <a:rPr lang="uk-UA" dirty="0"/>
+              <a:t>засобом</a:t>
+            </a:r>
+            <a:endParaRPr lang="ru-RU" dirty="0"/>
+          </a:p>
+        </p:txBody>
+      </p:sp>
+    </p:spTree>
+    <p:extLst>
+      <p:ext uri="{BB962C8B-B14F-4D97-AF65-F5344CB8AC3E}">
+        <p14:creationId xmlns:p14="http://schemas.microsoft.com/office/powerpoint/2010/main" val="1624156455"/>
+      </p:ext>
+    </p:extLst>
+  </p:cSld>
+  <p:clrMapOvr>
+    <a:masterClrMapping/>
+  </p:clrMapOvr>
+</p:sld>
+</file>
+
 <file path=ppt/slides/slide2.xml><?xml version="1.0" encoding="utf-8"?>
 <p:sld xmlns:a="http://schemas.openxmlformats.org/drawingml/2006/main" xmlns:r="http://schemas.openxmlformats.org/officeDocument/2006/relationships" xmlns:p="http://schemas.openxmlformats.org/presentationml/2006/main">
   <p:cSld>
@@ -6070,7 +6304,7 @@
           <p:cNvPr id="2" name="Заголовок 1">
             <a:extLst>
               <a:ext uri="{FF2B5EF4-FFF2-40B4-BE49-F238E27FC236}">
-                <a16:creationId xmlns:a16="http://schemas.microsoft.com/office/drawing/2014/main" id="{FD48F228-7FA6-4B38-96D9-54048ED72CEE}"/>
+                <a16:creationId xmlns:a16="http://schemas.microsoft.com/office/drawing/2014/main" id="{311E83E8-1D9A-4478-BD40-5C7806433F1C}"/>
               </a:ext>
             </a:extLst>
           </p:cNvPr>
@@ -6078,36 +6312,70 @@
             <a:spLocks noGrp="1"/>
           </p:cNvSpPr>
           <p:nvPr>
-            <p:ph type="ctrTitle"/>
-          </p:nvPr>
-        </p:nvSpPr>
-        <p:spPr/>
-        <p:txBody>
-          <a:bodyPr/>
-          <a:lstStyle/>
-          <a:p>
+            <p:ph type="title"/>
+          </p:nvPr>
+        </p:nvSpPr>
+        <p:spPr>
+          <a:xfrm>
+            <a:off x="677334" y="4800600"/>
+            <a:ext cx="8596667" cy="566738"/>
+          </a:xfrm>
+        </p:spPr>
+        <p:txBody>
+          <a:bodyPr/>
+          <a:lstStyle/>
+          <a:p>
+            <a:pPr algn="ctr"/>
             <a:r>
               <a:rPr lang="uk-UA" dirty="0"/>
-              <a:t>Можливі засоби розробки</a:t>
+              <a:t>Діаграма варіантів використання</a:t>
             </a:r>
             <a:endParaRPr lang="ru-RU" dirty="0"/>
           </a:p>
         </p:txBody>
       </p:sp>
-      <p:sp>
-        <p:nvSpPr>
-          <p:cNvPr id="3" name="Подзаголовок 2">
+      <p:pic>
+        <p:nvPicPr>
+          <p:cNvPr id="6" name="Рисунок 5">
             <a:extLst>
               <a:ext uri="{FF2B5EF4-FFF2-40B4-BE49-F238E27FC236}">
-                <a16:creationId xmlns:a16="http://schemas.microsoft.com/office/drawing/2014/main" id="{3D51FBFB-E386-428D-AE75-A92AF86CEAEB}"/>
+                <a16:creationId xmlns:a16="http://schemas.microsoft.com/office/drawing/2014/main" id="{ACAE1657-1EB6-436A-94B8-0C42D2355F39}"/>
               </a:ext>
             </a:extLst>
           </p:cNvPr>
-          <p:cNvSpPr>
-            <a:spLocks noGrp="1"/>
-          </p:cNvSpPr>
-          <p:nvPr>
-            <p:ph type="subTitle" idx="1"/>
+          <p:cNvPicPr>
+            <a:picLocks noGrp="1" noChangeAspect="1"/>
+          </p:cNvPicPr>
+          <p:nvPr>
+            <p:ph type="pic" idx="1"/>
+          </p:nvPr>
+        </p:nvPicPr>
+        <p:blipFill rotWithShape="1">
+          <a:blip r:embed="rId2"/>
+          <a:srcRect l="-293" t="-230" b="-757"/>
+          <a:stretch/>
+        </p:blipFill>
+        <p:spPr>
+          <a:xfrm>
+            <a:off x="2840797" y="396483"/>
+            <a:ext cx="4269739" cy="3912930"/>
+          </a:xfrm>
+        </p:spPr>
+      </p:pic>
+      <p:sp>
+        <p:nvSpPr>
+          <p:cNvPr id="4" name="Текст 3">
+            <a:extLst>
+              <a:ext uri="{FF2B5EF4-FFF2-40B4-BE49-F238E27FC236}">
+                <a16:creationId xmlns:a16="http://schemas.microsoft.com/office/drawing/2014/main" id="{C0A990B5-0088-4362-9863-7548B4E6A104}"/>
+              </a:ext>
+            </a:extLst>
+          </p:cNvPr>
+          <p:cNvSpPr>
+            <a:spLocks noGrp="1"/>
+          </p:cNvSpPr>
+          <p:nvPr>
+            <p:ph type="body" sz="half" idx="2"/>
           </p:nvPr>
         </p:nvSpPr>
         <p:spPr/>
@@ -6115,14 +6383,14 @@
           <a:bodyPr/>
           <a:lstStyle/>
           <a:p>
-            <a:endParaRPr lang="ru-RU"/>
+            <a:endParaRPr lang="ru-RU" dirty="0"/>
           </a:p>
         </p:txBody>
       </p:sp>
     </p:spTree>
     <p:extLst>
       <p:ext uri="{BB962C8B-B14F-4D97-AF65-F5344CB8AC3E}">
-        <p14:creationId xmlns:p14="http://schemas.microsoft.com/office/powerpoint/2010/main" val="1508207953"/>
+        <p14:creationId xmlns:p14="http://schemas.microsoft.com/office/powerpoint/2010/main" val="2187748285"/>
       </p:ext>
     </p:extLst>
   </p:cSld>
@@ -6154,7 +6422,7 @@
           <p:cNvPr id="2" name="Заголовок 1">
             <a:extLst>
               <a:ext uri="{FF2B5EF4-FFF2-40B4-BE49-F238E27FC236}">
-                <a16:creationId xmlns:a16="http://schemas.microsoft.com/office/drawing/2014/main" id="{1F591583-A9B1-449C-A887-12D95D80C176}"/>
+                <a16:creationId xmlns:a16="http://schemas.microsoft.com/office/drawing/2014/main" id="{FD48F228-7FA6-4B38-96D9-54048ED72CEE}"/>
               </a:ext>
             </a:extLst>
           </p:cNvPr>
@@ -6162,7 +6430,7 @@
             <a:spLocks noGrp="1"/>
           </p:cNvSpPr>
           <p:nvPr>
-            <p:ph type="title"/>
+            <p:ph type="ctrTitle"/>
           </p:nvPr>
         </p:nvSpPr>
         <p:spPr/>
@@ -6171,8 +6439,8 @@
           <a:lstStyle/>
           <a:p>
             <a:r>
-              <a:rPr lang="en-US" dirty="0"/>
-              <a:t>Windows Forms</a:t>
+              <a:rPr lang="uk-UA" dirty="0"/>
+              <a:t>Можливі засоби розробки</a:t>
             </a:r>
             <a:endParaRPr lang="ru-RU" dirty="0"/>
           </a:p>
@@ -6180,10 +6448,10 @@
       </p:sp>
       <p:sp>
         <p:nvSpPr>
-          <p:cNvPr id="3" name="Объект 2">
+          <p:cNvPr id="3" name="Подзаголовок 2">
             <a:extLst>
               <a:ext uri="{FF2B5EF4-FFF2-40B4-BE49-F238E27FC236}">
-                <a16:creationId xmlns:a16="http://schemas.microsoft.com/office/drawing/2014/main" id="{23A8B676-83A9-4C4E-946E-43CE7DCAF09A}"/>
+                <a16:creationId xmlns:a16="http://schemas.microsoft.com/office/drawing/2014/main" id="{3D51FBFB-E386-428D-AE75-A92AF86CEAEB}"/>
               </a:ext>
             </a:extLst>
           </p:cNvPr>
@@ -6191,7 +6459,7 @@
             <a:spLocks noGrp="1"/>
           </p:cNvSpPr>
           <p:nvPr>
-            <p:ph idx="1"/>
+            <p:ph type="subTitle" idx="1"/>
           </p:nvPr>
         </p:nvSpPr>
         <p:spPr/>
@@ -6199,63 +6467,6 @@
           <a:bodyPr/>
           <a:lstStyle/>
           <a:p>
-            <a:r>
-              <a:rPr lang="uk-UA" dirty="0"/>
-              <a:t>Переваги:</a:t>
-            </a:r>
-          </a:p>
-          <a:p>
-            <a:pPr lvl="1"/>
-            <a:r>
-              <a:rPr lang="uk-UA" dirty="0"/>
-              <a:t>Простота розробки</a:t>
-            </a:r>
-          </a:p>
-          <a:p>
-            <a:pPr lvl="1"/>
-            <a:r>
-              <a:rPr lang="uk-UA" dirty="0"/>
-              <a:t>Убудованість у </a:t>
-            </a:r>
-            <a:r>
-              <a:rPr lang="en-US" dirty="0"/>
-              <a:t>Visual Studio IDE</a:t>
-            </a:r>
-          </a:p>
-          <a:p>
-            <a:pPr lvl="1"/>
-            <a:r>
-              <a:rPr lang="uk-UA" dirty="0"/>
-              <a:t>Вбудований</a:t>
-            </a:r>
-            <a:r>
-              <a:rPr lang="ru-RU" dirty="0"/>
-              <a:t> редактор форм</a:t>
-            </a:r>
-            <a:br>
-              <a:rPr lang="ru-RU" dirty="0"/>
-            </a:br>
-            <a:endParaRPr lang="uk-UA" dirty="0"/>
-          </a:p>
-          <a:p>
-            <a:r>
-              <a:rPr lang="uk-UA" dirty="0"/>
-              <a:t>Недоліки:</a:t>
-            </a:r>
-          </a:p>
-          <a:p>
-            <a:pPr lvl="1"/>
-            <a:r>
-              <a:rPr lang="uk-UA" dirty="0"/>
-              <a:t>Застарілість</a:t>
-            </a:r>
-          </a:p>
-          <a:p>
-            <a:pPr lvl="1"/>
-            <a:r>
-              <a:rPr lang="uk-UA" dirty="0"/>
-              <a:t>Обмеженість</a:t>
-            </a:r>
             <a:endParaRPr lang="ru-RU" dirty="0"/>
           </a:p>
         </p:txBody>
@@ -6263,7 +6474,7 @@
     </p:spTree>
     <p:extLst>
       <p:ext uri="{BB962C8B-B14F-4D97-AF65-F5344CB8AC3E}">
-        <p14:creationId xmlns:p14="http://schemas.microsoft.com/office/powerpoint/2010/main" val="2809470715"/>
+        <p14:creationId xmlns:p14="http://schemas.microsoft.com/office/powerpoint/2010/main" val="1508207953"/>
       </p:ext>
     </p:extLst>
   </p:cSld>
@@ -6295,6 +6506,147 @@
           <p:cNvPr id="2" name="Заголовок 1">
             <a:extLst>
               <a:ext uri="{FF2B5EF4-FFF2-40B4-BE49-F238E27FC236}">
+                <a16:creationId xmlns:a16="http://schemas.microsoft.com/office/drawing/2014/main" id="{1F591583-A9B1-449C-A887-12D95D80C176}"/>
+              </a:ext>
+            </a:extLst>
+          </p:cNvPr>
+          <p:cNvSpPr>
+            <a:spLocks noGrp="1"/>
+          </p:cNvSpPr>
+          <p:nvPr>
+            <p:ph type="title"/>
+          </p:nvPr>
+        </p:nvSpPr>
+        <p:spPr/>
+        <p:txBody>
+          <a:bodyPr/>
+          <a:lstStyle/>
+          <a:p>
+            <a:r>
+              <a:rPr lang="en-US" dirty="0"/>
+              <a:t>Windows Forms</a:t>
+            </a:r>
+            <a:endParaRPr lang="ru-RU" dirty="0"/>
+          </a:p>
+        </p:txBody>
+      </p:sp>
+      <p:sp>
+        <p:nvSpPr>
+          <p:cNvPr id="3" name="Объект 2">
+            <a:extLst>
+              <a:ext uri="{FF2B5EF4-FFF2-40B4-BE49-F238E27FC236}">
+                <a16:creationId xmlns:a16="http://schemas.microsoft.com/office/drawing/2014/main" id="{23A8B676-83A9-4C4E-946E-43CE7DCAF09A}"/>
+              </a:ext>
+            </a:extLst>
+          </p:cNvPr>
+          <p:cNvSpPr>
+            <a:spLocks noGrp="1"/>
+          </p:cNvSpPr>
+          <p:nvPr>
+            <p:ph idx="1"/>
+          </p:nvPr>
+        </p:nvSpPr>
+        <p:spPr/>
+        <p:txBody>
+          <a:bodyPr/>
+          <a:lstStyle/>
+          <a:p>
+            <a:r>
+              <a:rPr lang="uk-UA" dirty="0"/>
+              <a:t>Переваги:</a:t>
+            </a:r>
+          </a:p>
+          <a:p>
+            <a:pPr lvl="1"/>
+            <a:r>
+              <a:rPr lang="uk-UA" dirty="0"/>
+              <a:t>Простота розробки</a:t>
+            </a:r>
+          </a:p>
+          <a:p>
+            <a:pPr lvl="1"/>
+            <a:r>
+              <a:rPr lang="uk-UA" dirty="0"/>
+              <a:t>Убудованість у </a:t>
+            </a:r>
+            <a:r>
+              <a:rPr lang="en-US" dirty="0"/>
+              <a:t>Visual Studio IDE</a:t>
+            </a:r>
+          </a:p>
+          <a:p>
+            <a:pPr lvl="1"/>
+            <a:r>
+              <a:rPr lang="uk-UA" dirty="0"/>
+              <a:t>Вбудований</a:t>
+            </a:r>
+            <a:r>
+              <a:rPr lang="ru-RU" dirty="0"/>
+              <a:t> редактор форм</a:t>
+            </a:r>
+            <a:br>
+              <a:rPr lang="ru-RU" dirty="0"/>
+            </a:br>
+            <a:endParaRPr lang="uk-UA" dirty="0"/>
+          </a:p>
+          <a:p>
+            <a:r>
+              <a:rPr lang="uk-UA" dirty="0"/>
+              <a:t>Недоліки:</a:t>
+            </a:r>
+          </a:p>
+          <a:p>
+            <a:pPr lvl="1"/>
+            <a:r>
+              <a:rPr lang="uk-UA" dirty="0"/>
+              <a:t>Застарілість</a:t>
+            </a:r>
+          </a:p>
+          <a:p>
+            <a:pPr lvl="1"/>
+            <a:r>
+              <a:rPr lang="uk-UA" dirty="0"/>
+              <a:t>Обмеженість</a:t>
+            </a:r>
+            <a:endParaRPr lang="ru-RU" dirty="0"/>
+          </a:p>
+        </p:txBody>
+      </p:sp>
+    </p:spTree>
+    <p:extLst>
+      <p:ext uri="{BB962C8B-B14F-4D97-AF65-F5344CB8AC3E}">
+        <p14:creationId xmlns:p14="http://schemas.microsoft.com/office/powerpoint/2010/main" val="2809470715"/>
+      </p:ext>
+    </p:extLst>
+  </p:cSld>
+  <p:clrMapOvr>
+    <a:masterClrMapping/>
+  </p:clrMapOvr>
+</p:sld>
+</file>
+
+<file path=ppt/slides/slide6.xml><?xml version="1.0" encoding="utf-8"?>
+<p:sld xmlns:a="http://schemas.openxmlformats.org/drawingml/2006/main" xmlns:r="http://schemas.openxmlformats.org/officeDocument/2006/relationships" xmlns:p="http://schemas.openxmlformats.org/presentationml/2006/main">
+  <p:cSld>
+    <p:spTree>
+      <p:nvGrpSpPr>
+        <p:cNvPr id="1" name=""/>
+        <p:cNvGrpSpPr/>
+        <p:nvPr/>
+      </p:nvGrpSpPr>
+      <p:grpSpPr>
+        <a:xfrm>
+          <a:off x="0" y="0"/>
+          <a:ext cx="0" cy="0"/>
+          <a:chOff x="0" y="0"/>
+          <a:chExt cx="0" cy="0"/>
+        </a:xfrm>
+      </p:grpSpPr>
+      <p:sp>
+        <p:nvSpPr>
+          <p:cNvPr id="2" name="Заголовок 1">
+            <a:extLst>
+              <a:ext uri="{FF2B5EF4-FFF2-40B4-BE49-F238E27FC236}">
                 <a16:creationId xmlns:a16="http://schemas.microsoft.com/office/drawing/2014/main" id="{C554F695-0338-4BA8-9002-C358212814A1}"/>
               </a:ext>
             </a:extLst>
@@ -6347,6 +6699,10 @@
           </a:p>
           <a:p>
             <a:pPr lvl="1"/>
+            <a:r>
+              <a:rPr lang="uk-UA" dirty="0"/>
+              <a:t>Привабливий дизайн за замовченням</a:t>
+            </a:r>
             <a:br>
               <a:rPr lang="uk-UA" dirty="0"/>
             </a:br>
@@ -6404,7 +6760,7 @@
         </p:blipFill>
         <p:spPr bwMode="auto">
           <a:xfrm>
-            <a:off x="4691426" y="816638"/>
+            <a:off x="4849367" y="292461"/>
             <a:ext cx="4582576" cy="1753033"/>
           </a:xfrm>
           <a:prstGeom prst="rect">
@@ -6435,7 +6791,7 @@
 </p:sld>
 </file>
 
-<file path=ppt/slides/slide6.xml><?xml version="1.0" encoding="utf-8"?>
+<file path=ppt/slides/slide7.xml><?xml version="1.0" encoding="utf-8"?>
 <p:sld xmlns:a="http://schemas.openxmlformats.org/drawingml/2006/main" xmlns:r="http://schemas.openxmlformats.org/officeDocument/2006/relationships" xmlns:p="http://schemas.openxmlformats.org/presentationml/2006/main">
   <p:cSld>
     <p:spTree>
@@ -6474,10 +6830,10 @@
           <a:lstStyle/>
           <a:p>
             <a:r>
-              <a:rPr lang="en-US" dirty="0"/>
+              <a:rPr lang="en-US" u="sng" dirty="0"/>
               <a:t>QT</a:t>
             </a:r>
-            <a:endParaRPr lang="ru-RU" dirty="0"/>
+            <a:endParaRPr lang="ru-RU" u="sng" dirty="0"/>
           </a:p>
         </p:txBody>
       </p:sp>
@@ -6604,90 +6960,6 @@
 </p:sld>
 </file>
 
-<file path=ppt/slides/slide7.xml><?xml version="1.0" encoding="utf-8"?>
-<p:sld xmlns:a="http://schemas.openxmlformats.org/drawingml/2006/main" xmlns:r="http://schemas.openxmlformats.org/officeDocument/2006/relationships" xmlns:p="http://schemas.openxmlformats.org/presentationml/2006/main">
-  <p:cSld>
-    <p:spTree>
-      <p:nvGrpSpPr>
-        <p:cNvPr id="1" name=""/>
-        <p:cNvGrpSpPr/>
-        <p:nvPr/>
-      </p:nvGrpSpPr>
-      <p:grpSpPr>
-        <a:xfrm>
-          <a:off x="0" y="0"/>
-          <a:ext cx="0" cy="0"/>
-          <a:chOff x="0" y="0"/>
-          <a:chExt cx="0" cy="0"/>
-        </a:xfrm>
-      </p:grpSpPr>
-      <p:sp>
-        <p:nvSpPr>
-          <p:cNvPr id="2" name="Заголовок 1">
-            <a:extLst>
-              <a:ext uri="{FF2B5EF4-FFF2-40B4-BE49-F238E27FC236}">
-                <a16:creationId xmlns:a16="http://schemas.microsoft.com/office/drawing/2014/main" id="{A3ADA424-F931-4515-A9EF-C7997798AB88}"/>
-              </a:ext>
-            </a:extLst>
-          </p:cNvPr>
-          <p:cNvSpPr>
-            <a:spLocks noGrp="1"/>
-          </p:cNvSpPr>
-          <p:nvPr>
-            <p:ph type="ctrTitle"/>
-          </p:nvPr>
-        </p:nvSpPr>
-        <p:spPr/>
-        <p:txBody>
-          <a:bodyPr/>
-          <a:lstStyle/>
-          <a:p>
-            <a:r>
-              <a:rPr lang="uk-UA" dirty="0"/>
-              <a:t>Хід розробки</a:t>
-            </a:r>
-            <a:endParaRPr lang="ru-RU" dirty="0"/>
-          </a:p>
-        </p:txBody>
-      </p:sp>
-      <p:sp>
-        <p:nvSpPr>
-          <p:cNvPr id="3" name="Подзаголовок 2">
-            <a:extLst>
-              <a:ext uri="{FF2B5EF4-FFF2-40B4-BE49-F238E27FC236}">
-                <a16:creationId xmlns:a16="http://schemas.microsoft.com/office/drawing/2014/main" id="{7F6101D8-33E5-497A-981D-CBAEA5E2031F}"/>
-              </a:ext>
-            </a:extLst>
-          </p:cNvPr>
-          <p:cNvSpPr>
-            <a:spLocks noGrp="1"/>
-          </p:cNvSpPr>
-          <p:nvPr>
-            <p:ph type="subTitle" idx="1"/>
-          </p:nvPr>
-        </p:nvSpPr>
-        <p:spPr/>
-        <p:txBody>
-          <a:bodyPr/>
-          <a:lstStyle/>
-          <a:p>
-            <a:endParaRPr lang="ru-RU"/>
-          </a:p>
-        </p:txBody>
-      </p:sp>
-    </p:spTree>
-    <p:extLst>
-      <p:ext uri="{BB962C8B-B14F-4D97-AF65-F5344CB8AC3E}">
-        <p14:creationId xmlns:p14="http://schemas.microsoft.com/office/powerpoint/2010/main" val="151012432"/>
-      </p:ext>
-    </p:extLst>
-  </p:cSld>
-  <p:clrMapOvr>
-    <a:masterClrMapping/>
-  </p:clrMapOvr>
-</p:sld>
-</file>
-
 <file path=ppt/slides/slide8.xml><?xml version="1.0" encoding="utf-8"?>
 <p:sld xmlns:a="http://schemas.openxmlformats.org/drawingml/2006/main" xmlns:r="http://schemas.openxmlformats.org/officeDocument/2006/relationships" xmlns:p="http://schemas.openxmlformats.org/presentationml/2006/main">
   <p:cSld>
@@ -6710,6 +6982,90 @@
           <p:cNvPr id="2" name="Заголовок 1">
             <a:extLst>
               <a:ext uri="{FF2B5EF4-FFF2-40B4-BE49-F238E27FC236}">
+                <a16:creationId xmlns:a16="http://schemas.microsoft.com/office/drawing/2014/main" id="{A3ADA424-F931-4515-A9EF-C7997798AB88}"/>
+              </a:ext>
+            </a:extLst>
+          </p:cNvPr>
+          <p:cNvSpPr>
+            <a:spLocks noGrp="1"/>
+          </p:cNvSpPr>
+          <p:nvPr>
+            <p:ph type="ctrTitle"/>
+          </p:nvPr>
+        </p:nvSpPr>
+        <p:spPr/>
+        <p:txBody>
+          <a:bodyPr/>
+          <a:lstStyle/>
+          <a:p>
+            <a:r>
+              <a:rPr lang="uk-UA" dirty="0"/>
+              <a:t>Хід розробки</a:t>
+            </a:r>
+            <a:endParaRPr lang="ru-RU" dirty="0"/>
+          </a:p>
+        </p:txBody>
+      </p:sp>
+      <p:sp>
+        <p:nvSpPr>
+          <p:cNvPr id="3" name="Подзаголовок 2">
+            <a:extLst>
+              <a:ext uri="{FF2B5EF4-FFF2-40B4-BE49-F238E27FC236}">
+                <a16:creationId xmlns:a16="http://schemas.microsoft.com/office/drawing/2014/main" id="{7F6101D8-33E5-497A-981D-CBAEA5E2031F}"/>
+              </a:ext>
+            </a:extLst>
+          </p:cNvPr>
+          <p:cNvSpPr>
+            <a:spLocks noGrp="1"/>
+          </p:cNvSpPr>
+          <p:nvPr>
+            <p:ph type="subTitle" idx="1"/>
+          </p:nvPr>
+        </p:nvSpPr>
+        <p:spPr/>
+        <p:txBody>
+          <a:bodyPr/>
+          <a:lstStyle/>
+          <a:p>
+            <a:endParaRPr lang="ru-RU" dirty="0"/>
+          </a:p>
+        </p:txBody>
+      </p:sp>
+    </p:spTree>
+    <p:extLst>
+      <p:ext uri="{BB962C8B-B14F-4D97-AF65-F5344CB8AC3E}">
+        <p14:creationId xmlns:p14="http://schemas.microsoft.com/office/powerpoint/2010/main" val="151012432"/>
+      </p:ext>
+    </p:extLst>
+  </p:cSld>
+  <p:clrMapOvr>
+    <a:masterClrMapping/>
+  </p:clrMapOvr>
+</p:sld>
+</file>
+
+<file path=ppt/slides/slide9.xml><?xml version="1.0" encoding="utf-8"?>
+<p:sld xmlns:a="http://schemas.openxmlformats.org/drawingml/2006/main" xmlns:r="http://schemas.openxmlformats.org/officeDocument/2006/relationships" xmlns:p="http://schemas.openxmlformats.org/presentationml/2006/main">
+  <p:cSld>
+    <p:spTree>
+      <p:nvGrpSpPr>
+        <p:cNvPr id="1" name=""/>
+        <p:cNvGrpSpPr/>
+        <p:nvPr/>
+      </p:nvGrpSpPr>
+      <p:grpSpPr>
+        <a:xfrm>
+          <a:off x="0" y="0"/>
+          <a:ext cx="0" cy="0"/>
+          <a:chOff x="0" y="0"/>
+          <a:chExt cx="0" cy="0"/>
+        </a:xfrm>
+      </p:grpSpPr>
+      <p:sp>
+        <p:nvSpPr>
+          <p:cNvPr id="2" name="Заголовок 1">
+            <a:extLst>
+              <a:ext uri="{FF2B5EF4-FFF2-40B4-BE49-F238E27FC236}">
                 <a16:creationId xmlns:a16="http://schemas.microsoft.com/office/drawing/2014/main" id="{724DA49A-87A5-4357-A780-A04098F3DEEA}"/>
               </a:ext>
             </a:extLst>
@@ -6728,7 +7084,7 @@
           <a:p>
             <a:r>
               <a:rPr lang="uk-UA" dirty="0"/>
-              <a:t>Використання </a:t>
+              <a:t>1. Використання </a:t>
             </a:r>
             <a:r>
               <a:rPr lang="en-US" dirty="0"/>
@@ -6759,7 +7115,25 @@
           <a:bodyPr/>
           <a:lstStyle/>
           <a:p>
-            <a:endParaRPr lang="ru-RU"/>
+            <a:r>
+              <a:rPr lang="uk-UA" dirty="0"/>
+              <a:t>Початкова ідея – використання </a:t>
+            </a:r>
+            <a:r>
+              <a:rPr lang="en-US" dirty="0"/>
+              <a:t>Windows API </a:t>
+            </a:r>
+            <a:r>
+              <a:rPr lang="uk-UA" dirty="0"/>
+              <a:t>для усіх модулів системи</a:t>
+            </a:r>
+          </a:p>
+          <a:p>
+            <a:r>
+              <a:rPr lang="uk-UA" dirty="0"/>
+              <a:t>Причина відмови – відсутність гнучкості та універсальності, різні засоби звертання до кожного компонента системи</a:t>
+            </a:r>
+            <a:endParaRPr lang="ru-RU" dirty="0"/>
           </a:p>
         </p:txBody>
       </p:sp>

</xml_diff>

<commit_message>
Work on the ppt 2
</commit_message>
<xml_diff>
--- a/Курсова робота на тему.pptx
+++ b/Курсова робота на тему.pptx
@@ -8,14 +8,26 @@
     <p:sldId id="256" r:id="rId2"/>
     <p:sldId id="257" r:id="rId3"/>
     <p:sldId id="266" r:id="rId4"/>
-    <p:sldId id="260" r:id="rId5"/>
-    <p:sldId id="261" r:id="rId6"/>
-    <p:sldId id="262" r:id="rId7"/>
-    <p:sldId id="263" r:id="rId8"/>
-    <p:sldId id="264" r:id="rId9"/>
-    <p:sldId id="265" r:id="rId10"/>
-    <p:sldId id="267" r:id="rId11"/>
-    <p:sldId id="268" r:id="rId12"/>
+    <p:sldId id="271" r:id="rId5"/>
+    <p:sldId id="272" r:id="rId6"/>
+    <p:sldId id="273" r:id="rId7"/>
+    <p:sldId id="274" r:id="rId8"/>
+    <p:sldId id="275" r:id="rId9"/>
+    <p:sldId id="260" r:id="rId10"/>
+    <p:sldId id="261" r:id="rId11"/>
+    <p:sldId id="262" r:id="rId12"/>
+    <p:sldId id="263" r:id="rId13"/>
+    <p:sldId id="264" r:id="rId14"/>
+    <p:sldId id="265" r:id="rId15"/>
+    <p:sldId id="267" r:id="rId16"/>
+    <p:sldId id="268" r:id="rId17"/>
+    <p:sldId id="269" r:id="rId18"/>
+    <p:sldId id="270" r:id="rId19"/>
+    <p:sldId id="276" r:id="rId20"/>
+    <p:sldId id="277" r:id="rId21"/>
+    <p:sldId id="278" r:id="rId22"/>
+    <p:sldId id="279" r:id="rId23"/>
+    <p:sldId id="281" r:id="rId24"/>
   </p:sldIdLst>
   <p:sldSz cx="12192000" cy="6858000"/>
   <p:notesSz cx="6858000" cy="9144000"/>
@@ -5897,615 +5909,6 @@
           <p:cNvPr id="2" name="Заголовок 1">
             <a:extLst>
               <a:ext uri="{FF2B5EF4-FFF2-40B4-BE49-F238E27FC236}">
-                <a16:creationId xmlns:a16="http://schemas.microsoft.com/office/drawing/2014/main" id="{2FF8E389-F322-4337-A3F0-65A43300C2FA}"/>
-              </a:ext>
-            </a:extLst>
-          </p:cNvPr>
-          <p:cNvSpPr>
-            <a:spLocks noGrp="1"/>
-          </p:cNvSpPr>
-          <p:nvPr>
-            <p:ph type="title"/>
-          </p:nvPr>
-        </p:nvSpPr>
-        <p:spPr/>
-        <p:txBody>
-          <a:bodyPr/>
-          <a:lstStyle/>
-          <a:p>
-            <a:r>
-              <a:rPr lang="uk-UA" dirty="0"/>
-              <a:t>2. Використання </a:t>
-            </a:r>
-            <a:r>
-              <a:rPr lang="en-US" dirty="0"/>
-              <a:t>WMI</a:t>
-            </a:r>
-            <a:endParaRPr lang="ru-RU" dirty="0"/>
-          </a:p>
-        </p:txBody>
-      </p:sp>
-      <p:sp>
-        <p:nvSpPr>
-          <p:cNvPr id="3" name="Объект 2">
-            <a:extLst>
-              <a:ext uri="{FF2B5EF4-FFF2-40B4-BE49-F238E27FC236}">
-                <a16:creationId xmlns:a16="http://schemas.microsoft.com/office/drawing/2014/main" id="{CEE1A871-6B14-4DB5-83D3-5446156BCD90}"/>
-              </a:ext>
-            </a:extLst>
-          </p:cNvPr>
-          <p:cNvSpPr>
-            <a:spLocks noGrp="1"/>
-          </p:cNvSpPr>
-          <p:nvPr>
-            <p:ph idx="1"/>
-          </p:nvPr>
-        </p:nvSpPr>
-        <p:spPr/>
-        <p:txBody>
-          <a:bodyPr/>
-          <a:lstStyle/>
-          <a:p>
-            <a:r>
-              <a:rPr lang="en-US" dirty="0"/>
-              <a:t>Windows Management Instrumentation, </a:t>
-            </a:r>
-            <a:r>
-              <a:rPr lang="uk-UA" dirty="0"/>
-              <a:t>пропоную універсальний спосіб звертання для отримання інформації про різні компоненти системи</a:t>
-            </a:r>
-          </a:p>
-          <a:p>
-            <a:r>
-              <a:rPr lang="uk-UA" dirty="0"/>
-              <a:t>Причина відмови – відсутність сумісності з </a:t>
-            </a:r>
-            <a:r>
-              <a:rPr lang="en-US" dirty="0"/>
-              <a:t>Qt</a:t>
-            </a:r>
-            <a:endParaRPr lang="ru-RU" dirty="0"/>
-          </a:p>
-        </p:txBody>
-      </p:sp>
-    </p:spTree>
-    <p:extLst>
-      <p:ext uri="{BB962C8B-B14F-4D97-AF65-F5344CB8AC3E}">
-        <p14:creationId xmlns:p14="http://schemas.microsoft.com/office/powerpoint/2010/main" val="3302766069"/>
-      </p:ext>
-    </p:extLst>
-  </p:cSld>
-  <p:clrMapOvr>
-    <a:masterClrMapping/>
-  </p:clrMapOvr>
-</p:sld>
-</file>
-
-<file path=ppt/slides/slide11.xml><?xml version="1.0" encoding="utf-8"?>
-<p:sld xmlns:a="http://schemas.openxmlformats.org/drawingml/2006/main" xmlns:r="http://schemas.openxmlformats.org/officeDocument/2006/relationships" xmlns:p="http://schemas.openxmlformats.org/presentationml/2006/main">
-  <p:cSld>
-    <p:spTree>
-      <p:nvGrpSpPr>
-        <p:cNvPr id="1" name=""/>
-        <p:cNvGrpSpPr/>
-        <p:nvPr/>
-      </p:nvGrpSpPr>
-      <p:grpSpPr>
-        <a:xfrm>
-          <a:off x="0" y="0"/>
-          <a:ext cx="0" cy="0"/>
-          <a:chOff x="0" y="0"/>
-          <a:chExt cx="0" cy="0"/>
-        </a:xfrm>
-      </p:grpSpPr>
-      <p:sp>
-        <p:nvSpPr>
-          <p:cNvPr id="2" name="Заголовок 1">
-            <a:extLst>
-              <a:ext uri="{FF2B5EF4-FFF2-40B4-BE49-F238E27FC236}">
-                <a16:creationId xmlns:a16="http://schemas.microsoft.com/office/drawing/2014/main" id="{6FAC47E4-BFE9-4F6E-AFCB-913AF8128214}"/>
-              </a:ext>
-            </a:extLst>
-          </p:cNvPr>
-          <p:cNvSpPr>
-            <a:spLocks noGrp="1"/>
-          </p:cNvSpPr>
-          <p:nvPr>
-            <p:ph type="title"/>
-          </p:nvPr>
-        </p:nvSpPr>
-        <p:spPr/>
-        <p:txBody>
-          <a:bodyPr/>
-          <a:lstStyle/>
-          <a:p>
-            <a:r>
-              <a:rPr lang="uk-UA" u="sng" dirty="0"/>
-              <a:t>3. Комбінований метод</a:t>
-            </a:r>
-            <a:endParaRPr lang="ru-RU" u="sng" dirty="0"/>
-          </a:p>
-        </p:txBody>
-      </p:sp>
-      <p:sp>
-        <p:nvSpPr>
-          <p:cNvPr id="3" name="Объект 2">
-            <a:extLst>
-              <a:ext uri="{FF2B5EF4-FFF2-40B4-BE49-F238E27FC236}">
-                <a16:creationId xmlns:a16="http://schemas.microsoft.com/office/drawing/2014/main" id="{E4A27A83-EF49-4DD5-AD18-A145411A1228}"/>
-              </a:ext>
-            </a:extLst>
-          </p:cNvPr>
-          <p:cNvSpPr>
-            <a:spLocks noGrp="1"/>
-          </p:cNvSpPr>
-          <p:nvPr>
-            <p:ph idx="1"/>
-          </p:nvPr>
-        </p:nvSpPr>
-        <p:spPr/>
-        <p:txBody>
-          <a:bodyPr/>
-          <a:lstStyle/>
-          <a:p>
-            <a:r>
-              <a:rPr lang="uk-UA" dirty="0"/>
-              <a:t>Використання </a:t>
-            </a:r>
-            <a:r>
-              <a:rPr lang="en-US" dirty="0"/>
-              <a:t>CLR (Common Language Runtime) </a:t>
-            </a:r>
-            <a:r>
-              <a:rPr lang="uk-UA" dirty="0"/>
-              <a:t>дає нам змогу використовувати </a:t>
-            </a:r>
-            <a:r>
-              <a:rPr lang="en-US" dirty="0"/>
-              <a:t>.NET</a:t>
-            </a:r>
-            <a:r>
-              <a:rPr lang="uk-UA" dirty="0"/>
-              <a:t> обробник </a:t>
-            </a:r>
-            <a:r>
-              <a:rPr lang="en-US" dirty="0"/>
-              <a:t>WMI</a:t>
-            </a:r>
-            <a:r>
-              <a:rPr lang="uk-UA" dirty="0"/>
-              <a:t>, що у свою чергу є сумісним з </a:t>
-            </a:r>
-            <a:r>
-              <a:rPr lang="en-US" dirty="0"/>
-              <a:t>Qt </a:t>
-            </a:r>
-            <a:r>
-              <a:rPr lang="uk-UA" dirty="0"/>
-              <a:t>засобом</a:t>
-            </a:r>
-            <a:endParaRPr lang="ru-RU" dirty="0"/>
-          </a:p>
-        </p:txBody>
-      </p:sp>
-    </p:spTree>
-    <p:extLst>
-      <p:ext uri="{BB962C8B-B14F-4D97-AF65-F5344CB8AC3E}">
-        <p14:creationId xmlns:p14="http://schemas.microsoft.com/office/powerpoint/2010/main" val="1624156455"/>
-      </p:ext>
-    </p:extLst>
-  </p:cSld>
-  <p:clrMapOvr>
-    <a:masterClrMapping/>
-  </p:clrMapOvr>
-</p:sld>
-</file>
-
-<file path=ppt/slides/slide2.xml><?xml version="1.0" encoding="utf-8"?>
-<p:sld xmlns:a="http://schemas.openxmlformats.org/drawingml/2006/main" xmlns:r="http://schemas.openxmlformats.org/officeDocument/2006/relationships" xmlns:p="http://schemas.openxmlformats.org/presentationml/2006/main">
-  <p:cSld>
-    <p:spTree>
-      <p:nvGrpSpPr>
-        <p:cNvPr id="1" name=""/>
-        <p:cNvGrpSpPr/>
-        <p:nvPr/>
-      </p:nvGrpSpPr>
-      <p:grpSpPr>
-        <a:xfrm>
-          <a:off x="0" y="0"/>
-          <a:ext cx="0" cy="0"/>
-          <a:chOff x="0" y="0"/>
-          <a:chExt cx="0" cy="0"/>
-        </a:xfrm>
-      </p:grpSpPr>
-      <p:sp>
-        <p:nvSpPr>
-          <p:cNvPr id="2" name="Заголовок 1">
-            <a:extLst>
-              <a:ext uri="{FF2B5EF4-FFF2-40B4-BE49-F238E27FC236}">
-                <a16:creationId xmlns:a16="http://schemas.microsoft.com/office/drawing/2014/main" id="{D0AAF69D-A1BF-47B9-A76C-E9EB1DC28771}"/>
-              </a:ext>
-            </a:extLst>
-          </p:cNvPr>
-          <p:cNvSpPr>
-            <a:spLocks noGrp="1"/>
-          </p:cNvSpPr>
-          <p:nvPr>
-            <p:ph type="title"/>
-          </p:nvPr>
-        </p:nvSpPr>
-        <p:spPr/>
-        <p:txBody>
-          <a:bodyPr/>
-          <a:lstStyle/>
-          <a:p>
-            <a:r>
-              <a:rPr lang="uk-UA" dirty="0"/>
-              <a:t>Технічне завдання</a:t>
-            </a:r>
-            <a:endParaRPr lang="ru-RU" dirty="0"/>
-          </a:p>
-        </p:txBody>
-      </p:sp>
-      <p:sp>
-        <p:nvSpPr>
-          <p:cNvPr id="3" name="Объект 2">
-            <a:extLst>
-              <a:ext uri="{FF2B5EF4-FFF2-40B4-BE49-F238E27FC236}">
-                <a16:creationId xmlns:a16="http://schemas.microsoft.com/office/drawing/2014/main" id="{8AF444F8-22C4-44D0-8E5A-F20A05B3CA4C}"/>
-              </a:ext>
-            </a:extLst>
-          </p:cNvPr>
-          <p:cNvSpPr>
-            <a:spLocks noGrp="1"/>
-          </p:cNvSpPr>
-          <p:nvPr>
-            <p:ph idx="1"/>
-          </p:nvPr>
-        </p:nvSpPr>
-        <p:spPr/>
-        <p:txBody>
-          <a:bodyPr>
-            <a:normAutofit lnSpcReduction="10000"/>
-          </a:bodyPr>
-          <a:lstStyle/>
-          <a:p>
-            <a:r>
-              <a:rPr lang="uk-UA" dirty="0"/>
-              <a:t>Програма збору інформації про систему </a:t>
-            </a:r>
-          </a:p>
-          <a:p>
-            <a:r>
-              <a:rPr lang="uk-UA" dirty="0"/>
-              <a:t>Можливості її включають в себе повний набір відомостей про комп'ютер</a:t>
-            </a:r>
-            <a:endParaRPr lang="ru-RU" dirty="0"/>
-          </a:p>
-          <a:p>
-            <a:r>
-              <a:rPr lang="uk-UA" dirty="0"/>
-              <a:t>Функціонально присутні закладки: </a:t>
-            </a:r>
-            <a:endParaRPr lang="ru-RU" dirty="0"/>
-          </a:p>
-          <a:p>
-            <a:pPr lvl="1"/>
-            <a:r>
-              <a:rPr lang="uk-UA" dirty="0" err="1"/>
-              <a:t>System</a:t>
-            </a:r>
-            <a:r>
-              <a:rPr lang="uk-UA" dirty="0"/>
-              <a:t> - містить відомості про вміст комп'ютера, </a:t>
-            </a:r>
-            <a:endParaRPr lang="ru-RU" dirty="0"/>
-          </a:p>
-          <a:p>
-            <a:pPr lvl="1"/>
-            <a:r>
-              <a:rPr lang="uk-UA" dirty="0" err="1"/>
-              <a:t>Memory</a:t>
-            </a:r>
-            <a:r>
-              <a:rPr lang="uk-UA" dirty="0"/>
-              <a:t> - містить інформацію про оперативну пам'ять, </a:t>
-            </a:r>
-            <a:endParaRPr lang="ru-RU" dirty="0"/>
-          </a:p>
-          <a:p>
-            <a:pPr lvl="1"/>
-            <a:r>
-              <a:rPr lang="uk-UA" dirty="0" err="1"/>
-              <a:t>Software</a:t>
-            </a:r>
-            <a:r>
-              <a:rPr lang="uk-UA" dirty="0"/>
-              <a:t> - показує програмне забезпечення, встановлене на комп'ютері, </a:t>
-            </a:r>
-            <a:endParaRPr lang="ru-RU" dirty="0"/>
-          </a:p>
-          <a:p>
-            <a:pPr lvl="1"/>
-            <a:r>
-              <a:rPr lang="uk-UA" dirty="0" err="1"/>
-              <a:t>Drives</a:t>
-            </a:r>
-            <a:r>
-              <a:rPr lang="uk-UA" dirty="0"/>
-              <a:t> - покаже версію операційної системи, загальну інформацію по запущеним процесам, ниткам, віртуальним машинам, </a:t>
-            </a:r>
-          </a:p>
-          <a:p>
-            <a:pPr lvl="1"/>
-            <a:r>
-              <a:rPr lang="uk-UA" dirty="0" err="1"/>
-              <a:t>Summary</a:t>
-            </a:r>
-            <a:r>
-              <a:rPr lang="uk-UA" dirty="0"/>
-              <a:t> - покаже версію операційної системи, загальну інформацію по запущеним процесам, ниткам, віртуальним машинам</a:t>
-            </a:r>
-            <a:endParaRPr lang="ru-RU" dirty="0"/>
-          </a:p>
-          <a:p>
-            <a:pPr lvl="1"/>
-            <a:r>
-              <a:rPr lang="uk-UA" dirty="0"/>
-              <a:t>I/O </a:t>
-            </a:r>
-            <a:r>
-              <a:rPr lang="uk-UA" dirty="0" err="1"/>
-              <a:t>Devices</a:t>
-            </a:r>
-            <a:r>
-              <a:rPr lang="uk-UA" dirty="0"/>
-              <a:t> - містить інформацію про диски </a:t>
-            </a:r>
-            <a:endParaRPr lang="ru-RU" dirty="0"/>
-          </a:p>
-          <a:p>
-            <a:endParaRPr lang="ru-RU" dirty="0"/>
-          </a:p>
-        </p:txBody>
-      </p:sp>
-    </p:spTree>
-    <p:extLst>
-      <p:ext uri="{BB962C8B-B14F-4D97-AF65-F5344CB8AC3E}">
-        <p14:creationId xmlns:p14="http://schemas.microsoft.com/office/powerpoint/2010/main" val="2922523833"/>
-      </p:ext>
-    </p:extLst>
-  </p:cSld>
-  <p:clrMapOvr>
-    <a:masterClrMapping/>
-  </p:clrMapOvr>
-</p:sld>
-</file>
-
-<file path=ppt/slides/slide3.xml><?xml version="1.0" encoding="utf-8"?>
-<p:sld xmlns:a="http://schemas.openxmlformats.org/drawingml/2006/main" xmlns:r="http://schemas.openxmlformats.org/officeDocument/2006/relationships" xmlns:p="http://schemas.openxmlformats.org/presentationml/2006/main">
-  <p:cSld>
-    <p:spTree>
-      <p:nvGrpSpPr>
-        <p:cNvPr id="1" name=""/>
-        <p:cNvGrpSpPr/>
-        <p:nvPr/>
-      </p:nvGrpSpPr>
-      <p:grpSpPr>
-        <a:xfrm>
-          <a:off x="0" y="0"/>
-          <a:ext cx="0" cy="0"/>
-          <a:chOff x="0" y="0"/>
-          <a:chExt cx="0" cy="0"/>
-        </a:xfrm>
-      </p:grpSpPr>
-      <p:sp>
-        <p:nvSpPr>
-          <p:cNvPr id="2" name="Заголовок 1">
-            <a:extLst>
-              <a:ext uri="{FF2B5EF4-FFF2-40B4-BE49-F238E27FC236}">
-                <a16:creationId xmlns:a16="http://schemas.microsoft.com/office/drawing/2014/main" id="{311E83E8-1D9A-4478-BD40-5C7806433F1C}"/>
-              </a:ext>
-            </a:extLst>
-          </p:cNvPr>
-          <p:cNvSpPr>
-            <a:spLocks noGrp="1"/>
-          </p:cNvSpPr>
-          <p:nvPr>
-            <p:ph type="title"/>
-          </p:nvPr>
-        </p:nvSpPr>
-        <p:spPr>
-          <a:xfrm>
-            <a:off x="677334" y="4800600"/>
-            <a:ext cx="8596667" cy="566738"/>
-          </a:xfrm>
-        </p:spPr>
-        <p:txBody>
-          <a:bodyPr/>
-          <a:lstStyle/>
-          <a:p>
-            <a:pPr algn="ctr"/>
-            <a:r>
-              <a:rPr lang="uk-UA" dirty="0"/>
-              <a:t>Діаграма варіантів використання</a:t>
-            </a:r>
-            <a:endParaRPr lang="ru-RU" dirty="0"/>
-          </a:p>
-        </p:txBody>
-      </p:sp>
-      <p:pic>
-        <p:nvPicPr>
-          <p:cNvPr id="6" name="Рисунок 5">
-            <a:extLst>
-              <a:ext uri="{FF2B5EF4-FFF2-40B4-BE49-F238E27FC236}">
-                <a16:creationId xmlns:a16="http://schemas.microsoft.com/office/drawing/2014/main" id="{ACAE1657-1EB6-436A-94B8-0C42D2355F39}"/>
-              </a:ext>
-            </a:extLst>
-          </p:cNvPr>
-          <p:cNvPicPr>
-            <a:picLocks noGrp="1" noChangeAspect="1"/>
-          </p:cNvPicPr>
-          <p:nvPr>
-            <p:ph type="pic" idx="1"/>
-          </p:nvPr>
-        </p:nvPicPr>
-        <p:blipFill rotWithShape="1">
-          <a:blip r:embed="rId2"/>
-          <a:srcRect l="-293" t="-230" b="-757"/>
-          <a:stretch/>
-        </p:blipFill>
-        <p:spPr>
-          <a:xfrm>
-            <a:off x="2840797" y="396483"/>
-            <a:ext cx="4269739" cy="3912930"/>
-          </a:xfrm>
-        </p:spPr>
-      </p:pic>
-      <p:sp>
-        <p:nvSpPr>
-          <p:cNvPr id="4" name="Текст 3">
-            <a:extLst>
-              <a:ext uri="{FF2B5EF4-FFF2-40B4-BE49-F238E27FC236}">
-                <a16:creationId xmlns:a16="http://schemas.microsoft.com/office/drawing/2014/main" id="{C0A990B5-0088-4362-9863-7548B4E6A104}"/>
-              </a:ext>
-            </a:extLst>
-          </p:cNvPr>
-          <p:cNvSpPr>
-            <a:spLocks noGrp="1"/>
-          </p:cNvSpPr>
-          <p:nvPr>
-            <p:ph type="body" sz="half" idx="2"/>
-          </p:nvPr>
-        </p:nvSpPr>
-        <p:spPr/>
-        <p:txBody>
-          <a:bodyPr/>
-          <a:lstStyle/>
-          <a:p>
-            <a:endParaRPr lang="ru-RU" dirty="0"/>
-          </a:p>
-        </p:txBody>
-      </p:sp>
-    </p:spTree>
-    <p:extLst>
-      <p:ext uri="{BB962C8B-B14F-4D97-AF65-F5344CB8AC3E}">
-        <p14:creationId xmlns:p14="http://schemas.microsoft.com/office/powerpoint/2010/main" val="2187748285"/>
-      </p:ext>
-    </p:extLst>
-  </p:cSld>
-  <p:clrMapOvr>
-    <a:masterClrMapping/>
-  </p:clrMapOvr>
-</p:sld>
-</file>
-
-<file path=ppt/slides/slide4.xml><?xml version="1.0" encoding="utf-8"?>
-<p:sld xmlns:a="http://schemas.openxmlformats.org/drawingml/2006/main" xmlns:r="http://schemas.openxmlformats.org/officeDocument/2006/relationships" xmlns:p="http://schemas.openxmlformats.org/presentationml/2006/main">
-  <p:cSld>
-    <p:spTree>
-      <p:nvGrpSpPr>
-        <p:cNvPr id="1" name=""/>
-        <p:cNvGrpSpPr/>
-        <p:nvPr/>
-      </p:nvGrpSpPr>
-      <p:grpSpPr>
-        <a:xfrm>
-          <a:off x="0" y="0"/>
-          <a:ext cx="0" cy="0"/>
-          <a:chOff x="0" y="0"/>
-          <a:chExt cx="0" cy="0"/>
-        </a:xfrm>
-      </p:grpSpPr>
-      <p:sp>
-        <p:nvSpPr>
-          <p:cNvPr id="2" name="Заголовок 1">
-            <a:extLst>
-              <a:ext uri="{FF2B5EF4-FFF2-40B4-BE49-F238E27FC236}">
-                <a16:creationId xmlns:a16="http://schemas.microsoft.com/office/drawing/2014/main" id="{FD48F228-7FA6-4B38-96D9-54048ED72CEE}"/>
-              </a:ext>
-            </a:extLst>
-          </p:cNvPr>
-          <p:cNvSpPr>
-            <a:spLocks noGrp="1"/>
-          </p:cNvSpPr>
-          <p:nvPr>
-            <p:ph type="ctrTitle"/>
-          </p:nvPr>
-        </p:nvSpPr>
-        <p:spPr/>
-        <p:txBody>
-          <a:bodyPr/>
-          <a:lstStyle/>
-          <a:p>
-            <a:r>
-              <a:rPr lang="uk-UA" dirty="0"/>
-              <a:t>Можливі засоби розробки</a:t>
-            </a:r>
-            <a:endParaRPr lang="ru-RU" dirty="0"/>
-          </a:p>
-        </p:txBody>
-      </p:sp>
-      <p:sp>
-        <p:nvSpPr>
-          <p:cNvPr id="3" name="Подзаголовок 2">
-            <a:extLst>
-              <a:ext uri="{FF2B5EF4-FFF2-40B4-BE49-F238E27FC236}">
-                <a16:creationId xmlns:a16="http://schemas.microsoft.com/office/drawing/2014/main" id="{3D51FBFB-E386-428D-AE75-A92AF86CEAEB}"/>
-              </a:ext>
-            </a:extLst>
-          </p:cNvPr>
-          <p:cNvSpPr>
-            <a:spLocks noGrp="1"/>
-          </p:cNvSpPr>
-          <p:nvPr>
-            <p:ph type="subTitle" idx="1"/>
-          </p:nvPr>
-        </p:nvSpPr>
-        <p:spPr/>
-        <p:txBody>
-          <a:bodyPr/>
-          <a:lstStyle/>
-          <a:p>
-            <a:endParaRPr lang="ru-RU" dirty="0"/>
-          </a:p>
-        </p:txBody>
-      </p:sp>
-    </p:spTree>
-    <p:extLst>
-      <p:ext uri="{BB962C8B-B14F-4D97-AF65-F5344CB8AC3E}">
-        <p14:creationId xmlns:p14="http://schemas.microsoft.com/office/powerpoint/2010/main" val="1508207953"/>
-      </p:ext>
-    </p:extLst>
-  </p:cSld>
-  <p:clrMapOvr>
-    <a:masterClrMapping/>
-  </p:clrMapOvr>
-</p:sld>
-</file>
-
-<file path=ppt/slides/slide5.xml><?xml version="1.0" encoding="utf-8"?>
-<p:sld xmlns:a="http://schemas.openxmlformats.org/drawingml/2006/main" xmlns:r="http://schemas.openxmlformats.org/officeDocument/2006/relationships" xmlns:p="http://schemas.openxmlformats.org/presentationml/2006/main">
-  <p:cSld>
-    <p:spTree>
-      <p:nvGrpSpPr>
-        <p:cNvPr id="1" name=""/>
-        <p:cNvGrpSpPr/>
-        <p:nvPr/>
-      </p:nvGrpSpPr>
-      <p:grpSpPr>
-        <a:xfrm>
-          <a:off x="0" y="0"/>
-          <a:ext cx="0" cy="0"/>
-          <a:chOff x="0" y="0"/>
-          <a:chExt cx="0" cy="0"/>
-        </a:xfrm>
-      </p:grpSpPr>
-      <p:sp>
-        <p:nvSpPr>
-          <p:cNvPr id="2" name="Заголовок 1">
-            <a:extLst>
-              <a:ext uri="{FF2B5EF4-FFF2-40B4-BE49-F238E27FC236}">
                 <a16:creationId xmlns:a16="http://schemas.microsoft.com/office/drawing/2014/main" id="{1F591583-A9B1-449C-A887-12D95D80C176}"/>
               </a:ext>
             </a:extLst>
@@ -6625,7 +6028,7 @@
 </p:sld>
 </file>
 
-<file path=ppt/slides/slide6.xml><?xml version="1.0" encoding="utf-8"?>
+<file path=ppt/slides/slide11.xml><?xml version="1.0" encoding="utf-8"?>
 <p:sld xmlns:a="http://schemas.openxmlformats.org/drawingml/2006/main" xmlns:r="http://schemas.openxmlformats.org/officeDocument/2006/relationships" xmlns:p="http://schemas.openxmlformats.org/presentationml/2006/main">
   <p:cSld>
     <p:spTree>
@@ -6791,7 +6194,7 @@
 </p:sld>
 </file>
 
-<file path=ppt/slides/slide7.xml><?xml version="1.0" encoding="utf-8"?>
+<file path=ppt/slides/slide12.xml><?xml version="1.0" encoding="utf-8"?>
 <p:sld xmlns:a="http://schemas.openxmlformats.org/drawingml/2006/main" xmlns:r="http://schemas.openxmlformats.org/officeDocument/2006/relationships" xmlns:p="http://schemas.openxmlformats.org/presentationml/2006/main">
   <p:cSld>
     <p:spTree>
@@ -6832,6 +6235,18 @@
             <a:r>
               <a:rPr lang="en-US" u="sng" dirty="0"/>
               <a:t>QT</a:t>
+            </a:r>
+            <a:r>
+              <a:rPr lang="uk-UA" u="sng" dirty="0"/>
+              <a:t> (</a:t>
+            </a:r>
+            <a:r>
+              <a:rPr lang="en-US" u="sng" dirty="0"/>
+              <a:t>VSQT Library</a:t>
+            </a:r>
+            <a:r>
+              <a:rPr lang="uk-UA" u="sng" dirty="0"/>
+              <a:t>)</a:t>
             </a:r>
             <a:endParaRPr lang="ru-RU" u="sng" dirty="0"/>
           </a:p>
@@ -6960,6 +6375,1874 @@
 </p:sld>
 </file>
 
+<file path=ppt/slides/slide13.xml><?xml version="1.0" encoding="utf-8"?>
+<p:sld xmlns:a="http://schemas.openxmlformats.org/drawingml/2006/main" xmlns:r="http://schemas.openxmlformats.org/officeDocument/2006/relationships" xmlns:p="http://schemas.openxmlformats.org/presentationml/2006/main">
+  <p:cSld>
+    <p:spTree>
+      <p:nvGrpSpPr>
+        <p:cNvPr id="1" name=""/>
+        <p:cNvGrpSpPr/>
+        <p:nvPr/>
+      </p:nvGrpSpPr>
+      <p:grpSpPr>
+        <a:xfrm>
+          <a:off x="0" y="0"/>
+          <a:ext cx="0" cy="0"/>
+          <a:chOff x="0" y="0"/>
+          <a:chExt cx="0" cy="0"/>
+        </a:xfrm>
+      </p:grpSpPr>
+      <p:sp>
+        <p:nvSpPr>
+          <p:cNvPr id="2" name="Заголовок 1">
+            <a:extLst>
+              <a:ext uri="{FF2B5EF4-FFF2-40B4-BE49-F238E27FC236}">
+                <a16:creationId xmlns:a16="http://schemas.microsoft.com/office/drawing/2014/main" id="{A3ADA424-F931-4515-A9EF-C7997798AB88}"/>
+              </a:ext>
+            </a:extLst>
+          </p:cNvPr>
+          <p:cNvSpPr>
+            <a:spLocks noGrp="1"/>
+          </p:cNvSpPr>
+          <p:nvPr>
+            <p:ph type="ctrTitle"/>
+          </p:nvPr>
+        </p:nvSpPr>
+        <p:spPr/>
+        <p:txBody>
+          <a:bodyPr/>
+          <a:lstStyle/>
+          <a:p>
+            <a:r>
+              <a:rPr lang="uk-UA" dirty="0"/>
+              <a:t>Хід розробки</a:t>
+            </a:r>
+            <a:endParaRPr lang="ru-RU" dirty="0"/>
+          </a:p>
+        </p:txBody>
+      </p:sp>
+      <p:sp>
+        <p:nvSpPr>
+          <p:cNvPr id="3" name="Подзаголовок 2">
+            <a:extLst>
+              <a:ext uri="{FF2B5EF4-FFF2-40B4-BE49-F238E27FC236}">
+                <a16:creationId xmlns:a16="http://schemas.microsoft.com/office/drawing/2014/main" id="{7F6101D8-33E5-497A-981D-CBAEA5E2031F}"/>
+              </a:ext>
+            </a:extLst>
+          </p:cNvPr>
+          <p:cNvSpPr>
+            <a:spLocks noGrp="1"/>
+          </p:cNvSpPr>
+          <p:nvPr>
+            <p:ph type="subTitle" idx="1"/>
+          </p:nvPr>
+        </p:nvSpPr>
+        <p:spPr/>
+        <p:txBody>
+          <a:bodyPr/>
+          <a:lstStyle/>
+          <a:p>
+            <a:endParaRPr lang="ru-RU" dirty="0"/>
+          </a:p>
+        </p:txBody>
+      </p:sp>
+    </p:spTree>
+    <p:extLst>
+      <p:ext uri="{BB962C8B-B14F-4D97-AF65-F5344CB8AC3E}">
+        <p14:creationId xmlns:p14="http://schemas.microsoft.com/office/powerpoint/2010/main" val="151012432"/>
+      </p:ext>
+    </p:extLst>
+  </p:cSld>
+  <p:clrMapOvr>
+    <a:masterClrMapping/>
+  </p:clrMapOvr>
+</p:sld>
+</file>
+
+<file path=ppt/slides/slide14.xml><?xml version="1.0" encoding="utf-8"?>
+<p:sld xmlns:a="http://schemas.openxmlformats.org/drawingml/2006/main" xmlns:r="http://schemas.openxmlformats.org/officeDocument/2006/relationships" xmlns:p="http://schemas.openxmlformats.org/presentationml/2006/main">
+  <p:cSld>
+    <p:spTree>
+      <p:nvGrpSpPr>
+        <p:cNvPr id="1" name=""/>
+        <p:cNvGrpSpPr/>
+        <p:nvPr/>
+      </p:nvGrpSpPr>
+      <p:grpSpPr>
+        <a:xfrm>
+          <a:off x="0" y="0"/>
+          <a:ext cx="0" cy="0"/>
+          <a:chOff x="0" y="0"/>
+          <a:chExt cx="0" cy="0"/>
+        </a:xfrm>
+      </p:grpSpPr>
+      <p:sp>
+        <p:nvSpPr>
+          <p:cNvPr id="2" name="Заголовок 1">
+            <a:extLst>
+              <a:ext uri="{FF2B5EF4-FFF2-40B4-BE49-F238E27FC236}">
+                <a16:creationId xmlns:a16="http://schemas.microsoft.com/office/drawing/2014/main" id="{724DA49A-87A5-4357-A780-A04098F3DEEA}"/>
+              </a:ext>
+            </a:extLst>
+          </p:cNvPr>
+          <p:cNvSpPr>
+            <a:spLocks noGrp="1"/>
+          </p:cNvSpPr>
+          <p:nvPr>
+            <p:ph type="title"/>
+          </p:nvPr>
+        </p:nvSpPr>
+        <p:spPr/>
+        <p:txBody>
+          <a:bodyPr/>
+          <a:lstStyle/>
+          <a:p>
+            <a:r>
+              <a:rPr lang="uk-UA" dirty="0"/>
+              <a:t>1. Використання </a:t>
+            </a:r>
+            <a:r>
+              <a:rPr lang="en-US" dirty="0"/>
+              <a:t>Windows API</a:t>
+            </a:r>
+            <a:endParaRPr lang="ru-RU" dirty="0"/>
+          </a:p>
+        </p:txBody>
+      </p:sp>
+      <p:sp>
+        <p:nvSpPr>
+          <p:cNvPr id="3" name="Объект 2">
+            <a:extLst>
+              <a:ext uri="{FF2B5EF4-FFF2-40B4-BE49-F238E27FC236}">
+                <a16:creationId xmlns:a16="http://schemas.microsoft.com/office/drawing/2014/main" id="{D704EBCE-B827-4585-BB40-A040858FC07C}"/>
+              </a:ext>
+            </a:extLst>
+          </p:cNvPr>
+          <p:cNvSpPr>
+            <a:spLocks noGrp="1"/>
+          </p:cNvSpPr>
+          <p:nvPr>
+            <p:ph idx="1"/>
+          </p:nvPr>
+        </p:nvSpPr>
+        <p:spPr/>
+        <p:txBody>
+          <a:bodyPr/>
+          <a:lstStyle/>
+          <a:p>
+            <a:r>
+              <a:rPr lang="uk-UA" dirty="0"/>
+              <a:t>Початкова ідея – використання </a:t>
+            </a:r>
+            <a:r>
+              <a:rPr lang="en-US" dirty="0"/>
+              <a:t>Windows API </a:t>
+            </a:r>
+            <a:r>
+              <a:rPr lang="uk-UA" dirty="0"/>
+              <a:t>для усіх модулів системи</a:t>
+            </a:r>
+          </a:p>
+          <a:p>
+            <a:r>
+              <a:rPr lang="uk-UA" dirty="0"/>
+              <a:t>Причина відмови – відсутність гнучкості та універсальності, різні засоби звертання до кожного компонента системи</a:t>
+            </a:r>
+            <a:endParaRPr lang="ru-RU" dirty="0"/>
+          </a:p>
+        </p:txBody>
+      </p:sp>
+    </p:spTree>
+    <p:extLst>
+      <p:ext uri="{BB962C8B-B14F-4D97-AF65-F5344CB8AC3E}">
+        <p14:creationId xmlns:p14="http://schemas.microsoft.com/office/powerpoint/2010/main" val="4271271887"/>
+      </p:ext>
+    </p:extLst>
+  </p:cSld>
+  <p:clrMapOvr>
+    <a:masterClrMapping/>
+  </p:clrMapOvr>
+</p:sld>
+</file>
+
+<file path=ppt/slides/slide15.xml><?xml version="1.0" encoding="utf-8"?>
+<p:sld xmlns:a="http://schemas.openxmlformats.org/drawingml/2006/main" xmlns:r="http://schemas.openxmlformats.org/officeDocument/2006/relationships" xmlns:p="http://schemas.openxmlformats.org/presentationml/2006/main">
+  <p:cSld>
+    <p:spTree>
+      <p:nvGrpSpPr>
+        <p:cNvPr id="1" name=""/>
+        <p:cNvGrpSpPr/>
+        <p:nvPr/>
+      </p:nvGrpSpPr>
+      <p:grpSpPr>
+        <a:xfrm>
+          <a:off x="0" y="0"/>
+          <a:ext cx="0" cy="0"/>
+          <a:chOff x="0" y="0"/>
+          <a:chExt cx="0" cy="0"/>
+        </a:xfrm>
+      </p:grpSpPr>
+      <p:sp>
+        <p:nvSpPr>
+          <p:cNvPr id="2" name="Заголовок 1">
+            <a:extLst>
+              <a:ext uri="{FF2B5EF4-FFF2-40B4-BE49-F238E27FC236}">
+                <a16:creationId xmlns:a16="http://schemas.microsoft.com/office/drawing/2014/main" id="{2FF8E389-F322-4337-A3F0-65A43300C2FA}"/>
+              </a:ext>
+            </a:extLst>
+          </p:cNvPr>
+          <p:cNvSpPr>
+            <a:spLocks noGrp="1"/>
+          </p:cNvSpPr>
+          <p:nvPr>
+            <p:ph type="title"/>
+          </p:nvPr>
+        </p:nvSpPr>
+        <p:spPr/>
+        <p:txBody>
+          <a:bodyPr/>
+          <a:lstStyle/>
+          <a:p>
+            <a:r>
+              <a:rPr lang="uk-UA" dirty="0"/>
+              <a:t>2. Використання </a:t>
+            </a:r>
+            <a:r>
+              <a:rPr lang="en-US" dirty="0"/>
+              <a:t>WMI</a:t>
+            </a:r>
+            <a:endParaRPr lang="ru-RU" dirty="0"/>
+          </a:p>
+        </p:txBody>
+      </p:sp>
+      <p:sp>
+        <p:nvSpPr>
+          <p:cNvPr id="3" name="Объект 2">
+            <a:extLst>
+              <a:ext uri="{FF2B5EF4-FFF2-40B4-BE49-F238E27FC236}">
+                <a16:creationId xmlns:a16="http://schemas.microsoft.com/office/drawing/2014/main" id="{CEE1A871-6B14-4DB5-83D3-5446156BCD90}"/>
+              </a:ext>
+            </a:extLst>
+          </p:cNvPr>
+          <p:cNvSpPr>
+            <a:spLocks noGrp="1"/>
+          </p:cNvSpPr>
+          <p:nvPr>
+            <p:ph idx="1"/>
+          </p:nvPr>
+        </p:nvSpPr>
+        <p:spPr/>
+        <p:txBody>
+          <a:bodyPr/>
+          <a:lstStyle/>
+          <a:p>
+            <a:r>
+              <a:rPr lang="en-US" dirty="0"/>
+              <a:t>Windows Management Instrumentation, </a:t>
+            </a:r>
+            <a:r>
+              <a:rPr lang="uk-UA" dirty="0"/>
+              <a:t>пропоную універсальний спосіб звертання для отримання інформації про різні компоненти системи</a:t>
+            </a:r>
+          </a:p>
+          <a:p>
+            <a:r>
+              <a:rPr lang="uk-UA" dirty="0"/>
+              <a:t>Причина відмови – відсутність сумісності з </a:t>
+            </a:r>
+            <a:r>
+              <a:rPr lang="en-US" dirty="0"/>
+              <a:t>Qt</a:t>
+            </a:r>
+            <a:endParaRPr lang="ru-RU" dirty="0"/>
+          </a:p>
+        </p:txBody>
+      </p:sp>
+    </p:spTree>
+    <p:extLst>
+      <p:ext uri="{BB962C8B-B14F-4D97-AF65-F5344CB8AC3E}">
+        <p14:creationId xmlns:p14="http://schemas.microsoft.com/office/powerpoint/2010/main" val="3302766069"/>
+      </p:ext>
+    </p:extLst>
+  </p:cSld>
+  <p:clrMapOvr>
+    <a:masterClrMapping/>
+  </p:clrMapOvr>
+</p:sld>
+</file>
+
+<file path=ppt/slides/slide16.xml><?xml version="1.0" encoding="utf-8"?>
+<p:sld xmlns:a="http://schemas.openxmlformats.org/drawingml/2006/main" xmlns:r="http://schemas.openxmlformats.org/officeDocument/2006/relationships" xmlns:p="http://schemas.openxmlformats.org/presentationml/2006/main">
+  <p:cSld>
+    <p:spTree>
+      <p:nvGrpSpPr>
+        <p:cNvPr id="1" name=""/>
+        <p:cNvGrpSpPr/>
+        <p:nvPr/>
+      </p:nvGrpSpPr>
+      <p:grpSpPr>
+        <a:xfrm>
+          <a:off x="0" y="0"/>
+          <a:ext cx="0" cy="0"/>
+          <a:chOff x="0" y="0"/>
+          <a:chExt cx="0" cy="0"/>
+        </a:xfrm>
+      </p:grpSpPr>
+      <p:sp>
+        <p:nvSpPr>
+          <p:cNvPr id="2" name="Заголовок 1">
+            <a:extLst>
+              <a:ext uri="{FF2B5EF4-FFF2-40B4-BE49-F238E27FC236}">
+                <a16:creationId xmlns:a16="http://schemas.microsoft.com/office/drawing/2014/main" id="{6FAC47E4-BFE9-4F6E-AFCB-913AF8128214}"/>
+              </a:ext>
+            </a:extLst>
+          </p:cNvPr>
+          <p:cNvSpPr>
+            <a:spLocks noGrp="1"/>
+          </p:cNvSpPr>
+          <p:nvPr>
+            <p:ph type="title"/>
+          </p:nvPr>
+        </p:nvSpPr>
+        <p:spPr/>
+        <p:txBody>
+          <a:bodyPr/>
+          <a:lstStyle/>
+          <a:p>
+            <a:r>
+              <a:rPr lang="uk-UA" u="sng" dirty="0"/>
+              <a:t>3. Комбінований метод</a:t>
+            </a:r>
+            <a:endParaRPr lang="ru-RU" u="sng" dirty="0"/>
+          </a:p>
+        </p:txBody>
+      </p:sp>
+      <p:sp>
+        <p:nvSpPr>
+          <p:cNvPr id="3" name="Объект 2">
+            <a:extLst>
+              <a:ext uri="{FF2B5EF4-FFF2-40B4-BE49-F238E27FC236}">
+                <a16:creationId xmlns:a16="http://schemas.microsoft.com/office/drawing/2014/main" id="{E4A27A83-EF49-4DD5-AD18-A145411A1228}"/>
+              </a:ext>
+            </a:extLst>
+          </p:cNvPr>
+          <p:cNvSpPr>
+            <a:spLocks noGrp="1"/>
+          </p:cNvSpPr>
+          <p:nvPr>
+            <p:ph idx="1"/>
+          </p:nvPr>
+        </p:nvSpPr>
+        <p:spPr/>
+        <p:txBody>
+          <a:bodyPr/>
+          <a:lstStyle/>
+          <a:p>
+            <a:r>
+              <a:rPr lang="uk-UA" dirty="0"/>
+              <a:t>Використання </a:t>
+            </a:r>
+            <a:r>
+              <a:rPr lang="en-US" dirty="0"/>
+              <a:t>CLR (Common Language Runtime) </a:t>
+            </a:r>
+            <a:r>
+              <a:rPr lang="uk-UA" dirty="0"/>
+              <a:t>дає нам змогу використовувати </a:t>
+            </a:r>
+            <a:r>
+              <a:rPr lang="en-US" dirty="0"/>
+              <a:t>.NET</a:t>
+            </a:r>
+            <a:r>
+              <a:rPr lang="uk-UA" dirty="0"/>
+              <a:t> обробник </a:t>
+            </a:r>
+            <a:r>
+              <a:rPr lang="en-US" dirty="0"/>
+              <a:t>WMI</a:t>
+            </a:r>
+            <a:r>
+              <a:rPr lang="uk-UA" dirty="0"/>
+              <a:t>, що у свою чергу є сумісним з </a:t>
+            </a:r>
+            <a:r>
+              <a:rPr lang="en-US" dirty="0"/>
+              <a:t>Qt </a:t>
+            </a:r>
+            <a:r>
+              <a:rPr lang="uk-UA" dirty="0"/>
+              <a:t>засобом</a:t>
+            </a:r>
+            <a:endParaRPr lang="ru-RU" dirty="0"/>
+          </a:p>
+        </p:txBody>
+      </p:sp>
+    </p:spTree>
+    <p:extLst>
+      <p:ext uri="{BB962C8B-B14F-4D97-AF65-F5344CB8AC3E}">
+        <p14:creationId xmlns:p14="http://schemas.microsoft.com/office/powerpoint/2010/main" val="1624156455"/>
+      </p:ext>
+    </p:extLst>
+  </p:cSld>
+  <p:clrMapOvr>
+    <a:masterClrMapping/>
+  </p:clrMapOvr>
+</p:sld>
+</file>
+
+<file path=ppt/slides/slide17.xml><?xml version="1.0" encoding="utf-8"?>
+<p:sld xmlns:a="http://schemas.openxmlformats.org/drawingml/2006/main" xmlns:r="http://schemas.openxmlformats.org/officeDocument/2006/relationships" xmlns:p="http://schemas.openxmlformats.org/presentationml/2006/main">
+  <p:cSld>
+    <p:spTree>
+      <p:nvGrpSpPr>
+        <p:cNvPr id="1" name=""/>
+        <p:cNvGrpSpPr/>
+        <p:nvPr/>
+      </p:nvGrpSpPr>
+      <p:grpSpPr>
+        <a:xfrm>
+          <a:off x="0" y="0"/>
+          <a:ext cx="0" cy="0"/>
+          <a:chOff x="0" y="0"/>
+          <a:chExt cx="0" cy="0"/>
+        </a:xfrm>
+      </p:grpSpPr>
+      <p:sp>
+        <p:nvSpPr>
+          <p:cNvPr id="2" name="Заголовок 1">
+            <a:extLst>
+              <a:ext uri="{FF2B5EF4-FFF2-40B4-BE49-F238E27FC236}">
+                <a16:creationId xmlns:a16="http://schemas.microsoft.com/office/drawing/2014/main" id="{D4E49E35-7C0B-45FA-A217-82941B7A20BC}"/>
+              </a:ext>
+            </a:extLst>
+          </p:cNvPr>
+          <p:cNvSpPr>
+            <a:spLocks noGrp="1"/>
+          </p:cNvSpPr>
+          <p:nvPr>
+            <p:ph type="ctrTitle"/>
+          </p:nvPr>
+        </p:nvSpPr>
+        <p:spPr/>
+        <p:txBody>
+          <a:bodyPr/>
+          <a:lstStyle/>
+          <a:p>
+            <a:r>
+              <a:rPr lang="uk-UA" dirty="0"/>
+              <a:t>Архітектура системи</a:t>
+            </a:r>
+            <a:endParaRPr lang="ru-RU" dirty="0"/>
+          </a:p>
+        </p:txBody>
+      </p:sp>
+      <p:sp>
+        <p:nvSpPr>
+          <p:cNvPr id="3" name="Подзаголовок 2">
+            <a:extLst>
+              <a:ext uri="{FF2B5EF4-FFF2-40B4-BE49-F238E27FC236}">
+                <a16:creationId xmlns:a16="http://schemas.microsoft.com/office/drawing/2014/main" id="{F380D7AE-F3EE-4109-911E-2298D0971E36}"/>
+              </a:ext>
+            </a:extLst>
+          </p:cNvPr>
+          <p:cNvSpPr>
+            <a:spLocks noGrp="1"/>
+          </p:cNvSpPr>
+          <p:nvPr>
+            <p:ph type="subTitle" idx="1"/>
+          </p:nvPr>
+        </p:nvSpPr>
+        <p:spPr/>
+        <p:txBody>
+          <a:bodyPr/>
+          <a:lstStyle/>
+          <a:p>
+            <a:endParaRPr lang="ru-RU"/>
+          </a:p>
+        </p:txBody>
+      </p:sp>
+    </p:spTree>
+    <p:extLst>
+      <p:ext uri="{BB962C8B-B14F-4D97-AF65-F5344CB8AC3E}">
+        <p14:creationId xmlns:p14="http://schemas.microsoft.com/office/powerpoint/2010/main" val="2027780287"/>
+      </p:ext>
+    </p:extLst>
+  </p:cSld>
+  <p:clrMapOvr>
+    <a:masterClrMapping/>
+  </p:clrMapOvr>
+</p:sld>
+</file>
+
+<file path=ppt/slides/slide18.xml><?xml version="1.0" encoding="utf-8"?>
+<p:sld xmlns:a="http://schemas.openxmlformats.org/drawingml/2006/main" xmlns:r="http://schemas.openxmlformats.org/officeDocument/2006/relationships" xmlns:p="http://schemas.openxmlformats.org/presentationml/2006/main">
+  <p:cSld>
+    <p:spTree>
+      <p:nvGrpSpPr>
+        <p:cNvPr id="1" name=""/>
+        <p:cNvGrpSpPr/>
+        <p:nvPr/>
+      </p:nvGrpSpPr>
+      <p:grpSpPr>
+        <a:xfrm>
+          <a:off x="0" y="0"/>
+          <a:ext cx="0" cy="0"/>
+          <a:chOff x="0" y="0"/>
+          <a:chExt cx="0" cy="0"/>
+        </a:xfrm>
+      </p:grpSpPr>
+      <p:sp>
+        <p:nvSpPr>
+          <p:cNvPr id="2" name="Заголовок 1">
+            <a:extLst>
+              <a:ext uri="{FF2B5EF4-FFF2-40B4-BE49-F238E27FC236}">
+                <a16:creationId xmlns:a16="http://schemas.microsoft.com/office/drawing/2014/main" id="{67BF1F33-E01C-4A6A-B5EC-8A7380AF9820}"/>
+              </a:ext>
+            </a:extLst>
+          </p:cNvPr>
+          <p:cNvSpPr>
+            <a:spLocks noGrp="1"/>
+          </p:cNvSpPr>
+          <p:nvPr>
+            <p:ph type="title"/>
+          </p:nvPr>
+        </p:nvSpPr>
+        <p:spPr/>
+        <p:txBody>
+          <a:bodyPr/>
+          <a:lstStyle/>
+          <a:p>
+            <a:pPr algn="ctr"/>
+            <a:r>
+              <a:rPr lang="uk-UA" dirty="0"/>
+              <a:t>Діаграма класів</a:t>
+            </a:r>
+            <a:endParaRPr lang="ru-RU" dirty="0"/>
+          </a:p>
+        </p:txBody>
+      </p:sp>
+      <p:pic>
+        <p:nvPicPr>
+          <p:cNvPr id="6" name="Рисунок 5">
+            <a:extLst>
+              <a:ext uri="{FF2B5EF4-FFF2-40B4-BE49-F238E27FC236}">
+                <a16:creationId xmlns:a16="http://schemas.microsoft.com/office/drawing/2014/main" id="{1EA88975-B234-433E-9957-2301A1BC6740}"/>
+              </a:ext>
+            </a:extLst>
+          </p:cNvPr>
+          <p:cNvPicPr>
+            <a:picLocks noGrp="1" noChangeAspect="1"/>
+          </p:cNvPicPr>
+          <p:nvPr>
+            <p:ph type="pic" idx="1"/>
+          </p:nvPr>
+        </p:nvPicPr>
+        <p:blipFill rotWithShape="1">
+          <a:blip r:embed="rId2"/>
+          <a:srcRect t="-78" b="251"/>
+          <a:stretch/>
+        </p:blipFill>
+        <p:spPr>
+          <a:xfrm rot="5400000">
+            <a:off x="3347104" y="-2927310"/>
+            <a:ext cx="4326195" cy="10873437"/>
+          </a:xfrm>
+        </p:spPr>
+      </p:pic>
+      <p:sp>
+        <p:nvSpPr>
+          <p:cNvPr id="4" name="Текст 3">
+            <a:extLst>
+              <a:ext uri="{FF2B5EF4-FFF2-40B4-BE49-F238E27FC236}">
+                <a16:creationId xmlns:a16="http://schemas.microsoft.com/office/drawing/2014/main" id="{8D8B5EAE-DACB-4BAD-8026-0C462E26E287}"/>
+              </a:ext>
+            </a:extLst>
+          </p:cNvPr>
+          <p:cNvSpPr>
+            <a:spLocks noGrp="1"/>
+          </p:cNvSpPr>
+          <p:nvPr>
+            <p:ph type="body" sz="half" idx="2"/>
+          </p:nvPr>
+        </p:nvSpPr>
+        <p:spPr/>
+        <p:txBody>
+          <a:bodyPr/>
+          <a:lstStyle/>
+          <a:p>
+            <a:endParaRPr lang="ru-RU"/>
+          </a:p>
+        </p:txBody>
+      </p:sp>
+    </p:spTree>
+    <p:extLst>
+      <p:ext uri="{BB962C8B-B14F-4D97-AF65-F5344CB8AC3E}">
+        <p14:creationId xmlns:p14="http://schemas.microsoft.com/office/powerpoint/2010/main" val="1039969253"/>
+      </p:ext>
+    </p:extLst>
+  </p:cSld>
+  <p:clrMapOvr>
+    <a:masterClrMapping/>
+  </p:clrMapOvr>
+</p:sld>
+</file>
+
+<file path=ppt/slides/slide19.xml><?xml version="1.0" encoding="utf-8"?>
+<p:sld xmlns:a="http://schemas.openxmlformats.org/drawingml/2006/main" xmlns:r="http://schemas.openxmlformats.org/officeDocument/2006/relationships" xmlns:p="http://schemas.openxmlformats.org/presentationml/2006/main">
+  <p:cSld>
+    <p:spTree>
+      <p:nvGrpSpPr>
+        <p:cNvPr id="1" name=""/>
+        <p:cNvGrpSpPr/>
+        <p:nvPr/>
+      </p:nvGrpSpPr>
+      <p:grpSpPr>
+        <a:xfrm>
+          <a:off x="0" y="0"/>
+          <a:ext cx="0" cy="0"/>
+          <a:chOff x="0" y="0"/>
+          <a:chExt cx="0" cy="0"/>
+        </a:xfrm>
+      </p:grpSpPr>
+      <p:sp>
+        <p:nvSpPr>
+          <p:cNvPr id="2" name="Заголовок 1">
+            <a:extLst>
+              <a:ext uri="{FF2B5EF4-FFF2-40B4-BE49-F238E27FC236}">
+                <a16:creationId xmlns:a16="http://schemas.microsoft.com/office/drawing/2014/main" id="{DFDE088A-C892-4FE6-8BF0-7D4749F8C2C8}"/>
+              </a:ext>
+            </a:extLst>
+          </p:cNvPr>
+          <p:cNvSpPr>
+            <a:spLocks noGrp="1"/>
+          </p:cNvSpPr>
+          <p:nvPr>
+            <p:ph type="ctrTitle"/>
+          </p:nvPr>
+        </p:nvSpPr>
+        <p:spPr/>
+        <p:txBody>
+          <a:bodyPr/>
+          <a:lstStyle/>
+          <a:p>
+            <a:r>
+              <a:rPr lang="uk-UA" dirty="0"/>
+              <a:t>Користувацький інтерфейс</a:t>
+            </a:r>
+            <a:endParaRPr lang="ru-RU" dirty="0"/>
+          </a:p>
+        </p:txBody>
+      </p:sp>
+      <p:sp>
+        <p:nvSpPr>
+          <p:cNvPr id="3" name="Подзаголовок 2">
+            <a:extLst>
+              <a:ext uri="{FF2B5EF4-FFF2-40B4-BE49-F238E27FC236}">
+                <a16:creationId xmlns:a16="http://schemas.microsoft.com/office/drawing/2014/main" id="{F65CCBE5-DD44-43CD-9A44-5B9A4E20EAD0}"/>
+              </a:ext>
+            </a:extLst>
+          </p:cNvPr>
+          <p:cNvSpPr>
+            <a:spLocks noGrp="1"/>
+          </p:cNvSpPr>
+          <p:nvPr>
+            <p:ph type="subTitle" idx="1"/>
+          </p:nvPr>
+        </p:nvSpPr>
+        <p:spPr/>
+        <p:txBody>
+          <a:bodyPr/>
+          <a:lstStyle/>
+          <a:p>
+            <a:endParaRPr lang="ru-RU"/>
+          </a:p>
+        </p:txBody>
+      </p:sp>
+    </p:spTree>
+    <p:extLst>
+      <p:ext uri="{BB962C8B-B14F-4D97-AF65-F5344CB8AC3E}">
+        <p14:creationId xmlns:p14="http://schemas.microsoft.com/office/powerpoint/2010/main" val="289783521"/>
+      </p:ext>
+    </p:extLst>
+  </p:cSld>
+  <p:clrMapOvr>
+    <a:masterClrMapping/>
+  </p:clrMapOvr>
+</p:sld>
+</file>
+
+<file path=ppt/slides/slide2.xml><?xml version="1.0" encoding="utf-8"?>
+<p:sld xmlns:a="http://schemas.openxmlformats.org/drawingml/2006/main" xmlns:r="http://schemas.openxmlformats.org/officeDocument/2006/relationships" xmlns:p="http://schemas.openxmlformats.org/presentationml/2006/main">
+  <p:cSld>
+    <p:spTree>
+      <p:nvGrpSpPr>
+        <p:cNvPr id="1" name=""/>
+        <p:cNvGrpSpPr/>
+        <p:nvPr/>
+      </p:nvGrpSpPr>
+      <p:grpSpPr>
+        <a:xfrm>
+          <a:off x="0" y="0"/>
+          <a:ext cx="0" cy="0"/>
+          <a:chOff x="0" y="0"/>
+          <a:chExt cx="0" cy="0"/>
+        </a:xfrm>
+      </p:grpSpPr>
+      <p:sp>
+        <p:nvSpPr>
+          <p:cNvPr id="2" name="Заголовок 1">
+            <a:extLst>
+              <a:ext uri="{FF2B5EF4-FFF2-40B4-BE49-F238E27FC236}">
+                <a16:creationId xmlns:a16="http://schemas.microsoft.com/office/drawing/2014/main" id="{D0AAF69D-A1BF-47B9-A76C-E9EB1DC28771}"/>
+              </a:ext>
+            </a:extLst>
+          </p:cNvPr>
+          <p:cNvSpPr>
+            <a:spLocks noGrp="1"/>
+          </p:cNvSpPr>
+          <p:nvPr>
+            <p:ph type="title"/>
+          </p:nvPr>
+        </p:nvSpPr>
+        <p:spPr/>
+        <p:txBody>
+          <a:bodyPr/>
+          <a:lstStyle/>
+          <a:p>
+            <a:r>
+              <a:rPr lang="uk-UA" dirty="0"/>
+              <a:t>Технічне завдання</a:t>
+            </a:r>
+            <a:endParaRPr lang="ru-RU" dirty="0"/>
+          </a:p>
+        </p:txBody>
+      </p:sp>
+      <p:sp>
+        <p:nvSpPr>
+          <p:cNvPr id="3" name="Объект 2">
+            <a:extLst>
+              <a:ext uri="{FF2B5EF4-FFF2-40B4-BE49-F238E27FC236}">
+                <a16:creationId xmlns:a16="http://schemas.microsoft.com/office/drawing/2014/main" id="{8AF444F8-22C4-44D0-8E5A-F20A05B3CA4C}"/>
+              </a:ext>
+            </a:extLst>
+          </p:cNvPr>
+          <p:cNvSpPr>
+            <a:spLocks noGrp="1"/>
+          </p:cNvSpPr>
+          <p:nvPr>
+            <p:ph idx="1"/>
+          </p:nvPr>
+        </p:nvSpPr>
+        <p:spPr/>
+        <p:txBody>
+          <a:bodyPr>
+            <a:normAutofit lnSpcReduction="10000"/>
+          </a:bodyPr>
+          <a:lstStyle/>
+          <a:p>
+            <a:r>
+              <a:rPr lang="uk-UA" dirty="0"/>
+              <a:t>Програма збору інформації про систему </a:t>
+            </a:r>
+          </a:p>
+          <a:p>
+            <a:r>
+              <a:rPr lang="uk-UA" dirty="0"/>
+              <a:t>Можливості її включають в себе повний набір відомостей про комп'ютер</a:t>
+            </a:r>
+            <a:endParaRPr lang="ru-RU" dirty="0"/>
+          </a:p>
+          <a:p>
+            <a:r>
+              <a:rPr lang="uk-UA" dirty="0"/>
+              <a:t>Функціонально присутні закладки: </a:t>
+            </a:r>
+            <a:endParaRPr lang="ru-RU" dirty="0"/>
+          </a:p>
+          <a:p>
+            <a:pPr lvl="1"/>
+            <a:r>
+              <a:rPr lang="uk-UA" dirty="0" err="1"/>
+              <a:t>System</a:t>
+            </a:r>
+            <a:r>
+              <a:rPr lang="uk-UA" dirty="0"/>
+              <a:t> - містить відомості про вміст комп'ютера, </a:t>
+            </a:r>
+            <a:endParaRPr lang="ru-RU" dirty="0"/>
+          </a:p>
+          <a:p>
+            <a:pPr lvl="1"/>
+            <a:r>
+              <a:rPr lang="uk-UA" dirty="0" err="1"/>
+              <a:t>Memory</a:t>
+            </a:r>
+            <a:r>
+              <a:rPr lang="uk-UA" dirty="0"/>
+              <a:t> - містить інформацію про оперативну пам'ять, </a:t>
+            </a:r>
+            <a:endParaRPr lang="ru-RU" dirty="0"/>
+          </a:p>
+          <a:p>
+            <a:pPr lvl="1"/>
+            <a:r>
+              <a:rPr lang="uk-UA" dirty="0" err="1"/>
+              <a:t>Software</a:t>
+            </a:r>
+            <a:r>
+              <a:rPr lang="uk-UA" dirty="0"/>
+              <a:t> - показує програмне забезпечення, встановлене на комп'ютері, </a:t>
+            </a:r>
+            <a:endParaRPr lang="ru-RU" dirty="0"/>
+          </a:p>
+          <a:p>
+            <a:pPr lvl="1"/>
+            <a:r>
+              <a:rPr lang="uk-UA" dirty="0" err="1"/>
+              <a:t>Drives</a:t>
+            </a:r>
+            <a:r>
+              <a:rPr lang="uk-UA" dirty="0"/>
+              <a:t> - покаже версію операційної системи, загальну інформацію по запущеним процесам, ниткам, віртуальним машинам, </a:t>
+            </a:r>
+          </a:p>
+          <a:p>
+            <a:pPr lvl="1"/>
+            <a:r>
+              <a:rPr lang="uk-UA" dirty="0" err="1"/>
+              <a:t>Summary</a:t>
+            </a:r>
+            <a:r>
+              <a:rPr lang="uk-UA" dirty="0"/>
+              <a:t> - покаже версію операційної системи, загальну інформацію по запущеним процесам, ниткам, віртуальним машинам</a:t>
+            </a:r>
+            <a:endParaRPr lang="ru-RU" dirty="0"/>
+          </a:p>
+          <a:p>
+            <a:pPr lvl="1"/>
+            <a:r>
+              <a:rPr lang="uk-UA" dirty="0"/>
+              <a:t>I/O </a:t>
+            </a:r>
+            <a:r>
+              <a:rPr lang="uk-UA" dirty="0" err="1"/>
+              <a:t>Devices</a:t>
+            </a:r>
+            <a:r>
+              <a:rPr lang="uk-UA" dirty="0"/>
+              <a:t> - містить інформацію про диски </a:t>
+            </a:r>
+            <a:endParaRPr lang="ru-RU" dirty="0"/>
+          </a:p>
+          <a:p>
+            <a:endParaRPr lang="ru-RU" dirty="0"/>
+          </a:p>
+        </p:txBody>
+      </p:sp>
+    </p:spTree>
+    <p:extLst>
+      <p:ext uri="{BB962C8B-B14F-4D97-AF65-F5344CB8AC3E}">
+        <p14:creationId xmlns:p14="http://schemas.microsoft.com/office/powerpoint/2010/main" val="2922523833"/>
+      </p:ext>
+    </p:extLst>
+  </p:cSld>
+  <p:clrMapOvr>
+    <a:masterClrMapping/>
+  </p:clrMapOvr>
+</p:sld>
+</file>
+
+<file path=ppt/slides/slide20.xml><?xml version="1.0" encoding="utf-8"?>
+<p:sld xmlns:a="http://schemas.openxmlformats.org/drawingml/2006/main" xmlns:r="http://schemas.openxmlformats.org/officeDocument/2006/relationships" xmlns:p="http://schemas.openxmlformats.org/presentationml/2006/main">
+  <p:cSld>
+    <p:spTree>
+      <p:nvGrpSpPr>
+        <p:cNvPr id="1" name=""/>
+        <p:cNvGrpSpPr/>
+        <p:nvPr/>
+      </p:nvGrpSpPr>
+      <p:grpSpPr>
+        <a:xfrm>
+          <a:off x="0" y="0"/>
+          <a:ext cx="0" cy="0"/>
+          <a:chOff x="0" y="0"/>
+          <a:chExt cx="0" cy="0"/>
+        </a:xfrm>
+      </p:grpSpPr>
+      <p:sp>
+        <p:nvSpPr>
+          <p:cNvPr id="2" name="Заголовок 1">
+            <a:extLst>
+              <a:ext uri="{FF2B5EF4-FFF2-40B4-BE49-F238E27FC236}">
+                <a16:creationId xmlns:a16="http://schemas.microsoft.com/office/drawing/2014/main" id="{4FAE43CE-F7AA-4051-BA6D-6EF3D1BA0AF4}"/>
+              </a:ext>
+            </a:extLst>
+          </p:cNvPr>
+          <p:cNvSpPr>
+            <a:spLocks noGrp="1"/>
+          </p:cNvSpPr>
+          <p:nvPr>
+            <p:ph type="title"/>
+          </p:nvPr>
+        </p:nvSpPr>
+        <p:spPr/>
+        <p:txBody>
+          <a:bodyPr>
+            <a:normAutofit fontScale="90000"/>
+          </a:bodyPr>
+          <a:lstStyle/>
+          <a:p>
+            <a:r>
+              <a:rPr lang="uk-UA" dirty="0"/>
+              <a:t>Основні компоненти: бокова навігація, таблиця властивостей розділу</a:t>
+            </a:r>
+            <a:endParaRPr lang="ru-RU" dirty="0"/>
+          </a:p>
+        </p:txBody>
+      </p:sp>
+      <p:sp>
+        <p:nvSpPr>
+          <p:cNvPr id="4" name="Текст 3">
+            <a:extLst>
+              <a:ext uri="{FF2B5EF4-FFF2-40B4-BE49-F238E27FC236}">
+                <a16:creationId xmlns:a16="http://schemas.microsoft.com/office/drawing/2014/main" id="{9E1D67E3-FB5A-45AC-83EA-EF9295136223}"/>
+              </a:ext>
+            </a:extLst>
+          </p:cNvPr>
+          <p:cNvSpPr>
+            <a:spLocks noGrp="1"/>
+          </p:cNvSpPr>
+          <p:nvPr>
+            <p:ph type="body" sz="half" idx="2"/>
+          </p:nvPr>
+        </p:nvSpPr>
+        <p:spPr/>
+        <p:txBody>
+          <a:bodyPr/>
+          <a:lstStyle/>
+          <a:p>
+            <a:r>
+              <a:rPr lang="uk-UA" dirty="0"/>
+              <a:t>Запозичення гарної ідеї інтерфейсу у </a:t>
+            </a:r>
+            <a:r>
+              <a:rPr lang="en-US" dirty="0"/>
+              <a:t>AIDA64</a:t>
+            </a:r>
+            <a:endParaRPr lang="ru-RU" dirty="0"/>
+          </a:p>
+        </p:txBody>
+      </p:sp>
+      <p:pic>
+        <p:nvPicPr>
+          <p:cNvPr id="5" name="Рисунок 4">
+            <a:extLst>
+              <a:ext uri="{FF2B5EF4-FFF2-40B4-BE49-F238E27FC236}">
+                <a16:creationId xmlns:a16="http://schemas.microsoft.com/office/drawing/2014/main" id="{7FF22E74-863B-41E6-8EE0-8A8E2DBCA395}"/>
+              </a:ext>
+            </a:extLst>
+          </p:cNvPr>
+          <p:cNvPicPr>
+            <a:picLocks noChangeAspect="1"/>
+          </p:cNvPicPr>
+          <p:nvPr/>
+        </p:nvPicPr>
+        <p:blipFill>
+          <a:blip r:embed="rId2"/>
+          <a:stretch>
+            <a:fillRect/>
+          </a:stretch>
+        </p:blipFill>
+        <p:spPr>
+          <a:xfrm>
+            <a:off x="2818015" y="1"/>
+            <a:ext cx="6455986" cy="4290152"/>
+          </a:xfrm>
+          <a:prstGeom prst="rect">
+            <a:avLst/>
+          </a:prstGeom>
+        </p:spPr>
+      </p:pic>
+    </p:spTree>
+    <p:extLst>
+      <p:ext uri="{BB962C8B-B14F-4D97-AF65-F5344CB8AC3E}">
+        <p14:creationId xmlns:p14="http://schemas.microsoft.com/office/powerpoint/2010/main" val="3740189014"/>
+      </p:ext>
+    </p:extLst>
+  </p:cSld>
+  <p:clrMapOvr>
+    <a:masterClrMapping/>
+  </p:clrMapOvr>
+</p:sld>
+</file>
+
+<file path=ppt/slides/slide21.xml><?xml version="1.0" encoding="utf-8"?>
+<p:sld xmlns:a="http://schemas.openxmlformats.org/drawingml/2006/main" xmlns:r="http://schemas.openxmlformats.org/officeDocument/2006/relationships" xmlns:p="http://schemas.openxmlformats.org/presentationml/2006/main">
+  <p:cSld>
+    <p:spTree>
+      <p:nvGrpSpPr>
+        <p:cNvPr id="1" name=""/>
+        <p:cNvGrpSpPr/>
+        <p:nvPr/>
+      </p:nvGrpSpPr>
+      <p:grpSpPr>
+        <a:xfrm>
+          <a:off x="0" y="0"/>
+          <a:ext cx="0" cy="0"/>
+          <a:chOff x="0" y="0"/>
+          <a:chExt cx="0" cy="0"/>
+        </a:xfrm>
+      </p:grpSpPr>
+      <p:sp>
+        <p:nvSpPr>
+          <p:cNvPr id="2" name="Заголовок 1">
+            <a:extLst>
+              <a:ext uri="{FF2B5EF4-FFF2-40B4-BE49-F238E27FC236}">
+                <a16:creationId xmlns:a16="http://schemas.microsoft.com/office/drawing/2014/main" id="{88223A51-D5D9-419B-A21F-D0A356F52E82}"/>
+              </a:ext>
+            </a:extLst>
+          </p:cNvPr>
+          <p:cNvSpPr>
+            <a:spLocks noGrp="1"/>
+          </p:cNvSpPr>
+          <p:nvPr>
+            <p:ph type="ctrTitle"/>
+          </p:nvPr>
+        </p:nvSpPr>
+        <p:spPr/>
+        <p:txBody>
+          <a:bodyPr/>
+          <a:lstStyle/>
+          <a:p>
+            <a:r>
+              <a:rPr lang="uk-UA" dirty="0"/>
+              <a:t>Висновки</a:t>
+            </a:r>
+            <a:endParaRPr lang="ru-RU" dirty="0"/>
+          </a:p>
+        </p:txBody>
+      </p:sp>
+      <p:sp>
+        <p:nvSpPr>
+          <p:cNvPr id="3" name="Подзаголовок 2">
+            <a:extLst>
+              <a:ext uri="{FF2B5EF4-FFF2-40B4-BE49-F238E27FC236}">
+                <a16:creationId xmlns:a16="http://schemas.microsoft.com/office/drawing/2014/main" id="{B0FC0AD9-87D1-4623-8238-0995913DDB51}"/>
+              </a:ext>
+            </a:extLst>
+          </p:cNvPr>
+          <p:cNvSpPr>
+            <a:spLocks noGrp="1"/>
+          </p:cNvSpPr>
+          <p:nvPr>
+            <p:ph type="subTitle" idx="1"/>
+          </p:nvPr>
+        </p:nvSpPr>
+        <p:spPr/>
+        <p:txBody>
+          <a:bodyPr/>
+          <a:lstStyle/>
+          <a:p>
+            <a:endParaRPr lang="ru-RU"/>
+          </a:p>
+        </p:txBody>
+      </p:sp>
+    </p:spTree>
+    <p:extLst>
+      <p:ext uri="{BB962C8B-B14F-4D97-AF65-F5344CB8AC3E}">
+        <p14:creationId xmlns:p14="http://schemas.microsoft.com/office/powerpoint/2010/main" val="963381546"/>
+      </p:ext>
+    </p:extLst>
+  </p:cSld>
+  <p:clrMapOvr>
+    <a:masterClrMapping/>
+  </p:clrMapOvr>
+</p:sld>
+</file>
+
+<file path=ppt/slides/slide22.xml><?xml version="1.0" encoding="utf-8"?>
+<p:sld xmlns:a="http://schemas.openxmlformats.org/drawingml/2006/main" xmlns:r="http://schemas.openxmlformats.org/officeDocument/2006/relationships" xmlns:p="http://schemas.openxmlformats.org/presentationml/2006/main">
+  <p:cSld>
+    <p:spTree>
+      <p:nvGrpSpPr>
+        <p:cNvPr id="1" name=""/>
+        <p:cNvGrpSpPr/>
+        <p:nvPr/>
+      </p:nvGrpSpPr>
+      <p:grpSpPr>
+        <a:xfrm>
+          <a:off x="0" y="0"/>
+          <a:ext cx="0" cy="0"/>
+          <a:chOff x="0" y="0"/>
+          <a:chExt cx="0" cy="0"/>
+        </a:xfrm>
+      </p:grpSpPr>
+      <p:sp>
+        <p:nvSpPr>
+          <p:cNvPr id="2" name="Заголовок 1">
+            <a:extLst>
+              <a:ext uri="{FF2B5EF4-FFF2-40B4-BE49-F238E27FC236}">
+                <a16:creationId xmlns:a16="http://schemas.microsoft.com/office/drawing/2014/main" id="{8B2F3CD9-E4B1-4B30-89B1-FB742D4E4576}"/>
+              </a:ext>
+            </a:extLst>
+          </p:cNvPr>
+          <p:cNvSpPr>
+            <a:spLocks noGrp="1"/>
+          </p:cNvSpPr>
+          <p:nvPr>
+            <p:ph type="title"/>
+          </p:nvPr>
+        </p:nvSpPr>
+        <p:spPr/>
+        <p:txBody>
+          <a:bodyPr/>
+          <a:lstStyle/>
+          <a:p>
+            <a:r>
+              <a:rPr lang="uk-UA" dirty="0"/>
+              <a:t>У процесі викання курсової роби я:</a:t>
+            </a:r>
+            <a:endParaRPr lang="ru-RU" dirty="0"/>
+          </a:p>
+        </p:txBody>
+      </p:sp>
+      <p:sp>
+        <p:nvSpPr>
+          <p:cNvPr id="3" name="Объект 2">
+            <a:extLst>
+              <a:ext uri="{FF2B5EF4-FFF2-40B4-BE49-F238E27FC236}">
+                <a16:creationId xmlns:a16="http://schemas.microsoft.com/office/drawing/2014/main" id="{7505EE4F-240A-41C0-AB1A-C4061CF628AE}"/>
+              </a:ext>
+            </a:extLst>
+          </p:cNvPr>
+          <p:cNvSpPr>
+            <a:spLocks noGrp="1"/>
+          </p:cNvSpPr>
+          <p:nvPr>
+            <p:ph idx="1"/>
+          </p:nvPr>
+        </p:nvSpPr>
+        <p:spPr/>
+        <p:txBody>
+          <a:bodyPr/>
+          <a:lstStyle/>
+          <a:p>
+            <a:r>
+              <a:rPr lang="uk-UA" dirty="0"/>
+              <a:t>Розробив програмний застосунок що виводить перелік інформації про комп’ютер та операційну систему</a:t>
+            </a:r>
+          </a:p>
+          <a:p>
+            <a:r>
+              <a:rPr lang="uk-UA" dirty="0"/>
+              <a:t>Здобув навички роботи з такими технологіями як:</a:t>
+            </a:r>
+          </a:p>
+          <a:p>
+            <a:pPr lvl="1"/>
+            <a:r>
+              <a:rPr lang="en-US" dirty="0"/>
+              <a:t>Visual Studio</a:t>
+            </a:r>
+          </a:p>
+          <a:p>
+            <a:pPr lvl="1"/>
+            <a:r>
+              <a:rPr lang="en-US" dirty="0"/>
+              <a:t>Qt</a:t>
+            </a:r>
+          </a:p>
+          <a:p>
+            <a:pPr lvl="1"/>
+            <a:r>
+              <a:rPr lang="en-US" dirty="0"/>
+              <a:t>Win32 API</a:t>
+            </a:r>
+          </a:p>
+          <a:p>
+            <a:pPr lvl="1"/>
+            <a:r>
+              <a:rPr lang="en-US" dirty="0"/>
+              <a:t>WMI</a:t>
+            </a:r>
+          </a:p>
+          <a:p>
+            <a:pPr lvl="1"/>
+            <a:r>
+              <a:rPr lang="en-US" dirty="0"/>
+              <a:t>CLR</a:t>
+            </a:r>
+            <a:endParaRPr lang="uk-UA" dirty="0"/>
+          </a:p>
+          <a:p>
+            <a:r>
+              <a:rPr lang="uk-UA" dirty="0"/>
+              <a:t>Отримав задоволення</a:t>
+            </a:r>
+            <a:endParaRPr lang="ru-RU" dirty="0"/>
+          </a:p>
+        </p:txBody>
+      </p:sp>
+    </p:spTree>
+    <p:extLst>
+      <p:ext uri="{BB962C8B-B14F-4D97-AF65-F5344CB8AC3E}">
+        <p14:creationId xmlns:p14="http://schemas.microsoft.com/office/powerpoint/2010/main" val="3170133245"/>
+      </p:ext>
+    </p:extLst>
+  </p:cSld>
+  <p:clrMapOvr>
+    <a:masterClrMapping/>
+  </p:clrMapOvr>
+</p:sld>
+</file>
+
+<file path=ppt/slides/slide23.xml><?xml version="1.0" encoding="utf-8"?>
+<p:sld xmlns:a="http://schemas.openxmlformats.org/drawingml/2006/main" xmlns:r="http://schemas.openxmlformats.org/officeDocument/2006/relationships" xmlns:p="http://schemas.openxmlformats.org/presentationml/2006/main">
+  <p:cSld>
+    <p:spTree>
+      <p:nvGrpSpPr>
+        <p:cNvPr id="1" name=""/>
+        <p:cNvGrpSpPr/>
+        <p:nvPr/>
+      </p:nvGrpSpPr>
+      <p:grpSpPr>
+        <a:xfrm>
+          <a:off x="0" y="0"/>
+          <a:ext cx="0" cy="0"/>
+          <a:chOff x="0" y="0"/>
+          <a:chExt cx="0" cy="0"/>
+        </a:xfrm>
+      </p:grpSpPr>
+      <p:sp>
+        <p:nvSpPr>
+          <p:cNvPr id="2" name="Заголовок 1">
+            <a:extLst>
+              <a:ext uri="{FF2B5EF4-FFF2-40B4-BE49-F238E27FC236}">
+                <a16:creationId xmlns:a16="http://schemas.microsoft.com/office/drawing/2014/main" id="{1ABAC63D-43F9-4DD9-B3C9-F3B6A27DA181}"/>
+              </a:ext>
+            </a:extLst>
+          </p:cNvPr>
+          <p:cNvSpPr>
+            <a:spLocks noGrp="1"/>
+          </p:cNvSpPr>
+          <p:nvPr>
+            <p:ph type="ctrTitle"/>
+          </p:nvPr>
+        </p:nvSpPr>
+        <p:spPr/>
+        <p:txBody>
+          <a:bodyPr/>
+          <a:lstStyle/>
+          <a:p>
+            <a:pPr algn="ctr"/>
+            <a:r>
+              <a:rPr lang="uk-UA" dirty="0"/>
+              <a:t>Дякую за увагу</a:t>
+            </a:r>
+            <a:endParaRPr lang="ru-RU" dirty="0"/>
+          </a:p>
+        </p:txBody>
+      </p:sp>
+      <p:sp>
+        <p:nvSpPr>
+          <p:cNvPr id="3" name="Подзаголовок 2">
+            <a:extLst>
+              <a:ext uri="{FF2B5EF4-FFF2-40B4-BE49-F238E27FC236}">
+                <a16:creationId xmlns:a16="http://schemas.microsoft.com/office/drawing/2014/main" id="{91C98F3E-681B-4A63-A53C-F9385E81F62D}"/>
+              </a:ext>
+            </a:extLst>
+          </p:cNvPr>
+          <p:cNvSpPr>
+            <a:spLocks noGrp="1"/>
+          </p:cNvSpPr>
+          <p:nvPr>
+            <p:ph type="subTitle" idx="1"/>
+          </p:nvPr>
+        </p:nvSpPr>
+        <p:spPr/>
+        <p:txBody>
+          <a:bodyPr/>
+          <a:lstStyle/>
+          <a:p>
+            <a:endParaRPr lang="ru-RU" dirty="0"/>
+          </a:p>
+        </p:txBody>
+      </p:sp>
+    </p:spTree>
+    <p:extLst>
+      <p:ext uri="{BB962C8B-B14F-4D97-AF65-F5344CB8AC3E}">
+        <p14:creationId xmlns:p14="http://schemas.microsoft.com/office/powerpoint/2010/main" val="593462158"/>
+      </p:ext>
+    </p:extLst>
+  </p:cSld>
+  <p:clrMapOvr>
+    <a:masterClrMapping/>
+  </p:clrMapOvr>
+</p:sld>
+</file>
+
+<file path=ppt/slides/slide3.xml><?xml version="1.0" encoding="utf-8"?>
+<p:sld xmlns:a="http://schemas.openxmlformats.org/drawingml/2006/main" xmlns:r="http://schemas.openxmlformats.org/officeDocument/2006/relationships" xmlns:p="http://schemas.openxmlformats.org/presentationml/2006/main">
+  <p:cSld>
+    <p:spTree>
+      <p:nvGrpSpPr>
+        <p:cNvPr id="1" name=""/>
+        <p:cNvGrpSpPr/>
+        <p:nvPr/>
+      </p:nvGrpSpPr>
+      <p:grpSpPr>
+        <a:xfrm>
+          <a:off x="0" y="0"/>
+          <a:ext cx="0" cy="0"/>
+          <a:chOff x="0" y="0"/>
+          <a:chExt cx="0" cy="0"/>
+        </a:xfrm>
+      </p:grpSpPr>
+      <p:sp>
+        <p:nvSpPr>
+          <p:cNvPr id="2" name="Заголовок 1">
+            <a:extLst>
+              <a:ext uri="{FF2B5EF4-FFF2-40B4-BE49-F238E27FC236}">
+                <a16:creationId xmlns:a16="http://schemas.microsoft.com/office/drawing/2014/main" id="{311E83E8-1D9A-4478-BD40-5C7806433F1C}"/>
+              </a:ext>
+            </a:extLst>
+          </p:cNvPr>
+          <p:cNvSpPr>
+            <a:spLocks noGrp="1"/>
+          </p:cNvSpPr>
+          <p:nvPr>
+            <p:ph type="title"/>
+          </p:nvPr>
+        </p:nvSpPr>
+        <p:spPr>
+          <a:xfrm>
+            <a:off x="677334" y="4800600"/>
+            <a:ext cx="8596667" cy="566738"/>
+          </a:xfrm>
+        </p:spPr>
+        <p:txBody>
+          <a:bodyPr/>
+          <a:lstStyle/>
+          <a:p>
+            <a:pPr algn="ctr"/>
+            <a:r>
+              <a:rPr lang="uk-UA" dirty="0"/>
+              <a:t>Діаграма варіантів використання</a:t>
+            </a:r>
+            <a:endParaRPr lang="ru-RU" dirty="0"/>
+          </a:p>
+        </p:txBody>
+      </p:sp>
+      <p:pic>
+        <p:nvPicPr>
+          <p:cNvPr id="6" name="Рисунок 5">
+            <a:extLst>
+              <a:ext uri="{FF2B5EF4-FFF2-40B4-BE49-F238E27FC236}">
+                <a16:creationId xmlns:a16="http://schemas.microsoft.com/office/drawing/2014/main" id="{ACAE1657-1EB6-436A-94B8-0C42D2355F39}"/>
+              </a:ext>
+            </a:extLst>
+          </p:cNvPr>
+          <p:cNvPicPr>
+            <a:picLocks noGrp="1" noChangeAspect="1"/>
+          </p:cNvPicPr>
+          <p:nvPr>
+            <p:ph type="pic" idx="1"/>
+          </p:nvPr>
+        </p:nvPicPr>
+        <p:blipFill rotWithShape="1">
+          <a:blip r:embed="rId2"/>
+          <a:srcRect l="-293" t="-230" b="-757"/>
+          <a:stretch/>
+        </p:blipFill>
+        <p:spPr>
+          <a:xfrm>
+            <a:off x="2840797" y="396483"/>
+            <a:ext cx="4269739" cy="3912930"/>
+          </a:xfrm>
+        </p:spPr>
+      </p:pic>
+      <p:sp>
+        <p:nvSpPr>
+          <p:cNvPr id="4" name="Текст 3">
+            <a:extLst>
+              <a:ext uri="{FF2B5EF4-FFF2-40B4-BE49-F238E27FC236}">
+                <a16:creationId xmlns:a16="http://schemas.microsoft.com/office/drawing/2014/main" id="{C0A990B5-0088-4362-9863-7548B4E6A104}"/>
+              </a:ext>
+            </a:extLst>
+          </p:cNvPr>
+          <p:cNvSpPr>
+            <a:spLocks noGrp="1"/>
+          </p:cNvSpPr>
+          <p:nvPr>
+            <p:ph type="body" sz="half" idx="2"/>
+          </p:nvPr>
+        </p:nvSpPr>
+        <p:spPr/>
+        <p:txBody>
+          <a:bodyPr/>
+          <a:lstStyle/>
+          <a:p>
+            <a:endParaRPr lang="ru-RU" dirty="0"/>
+          </a:p>
+        </p:txBody>
+      </p:sp>
+    </p:spTree>
+    <p:extLst>
+      <p:ext uri="{BB962C8B-B14F-4D97-AF65-F5344CB8AC3E}">
+        <p14:creationId xmlns:p14="http://schemas.microsoft.com/office/powerpoint/2010/main" val="2187748285"/>
+      </p:ext>
+    </p:extLst>
+  </p:cSld>
+  <p:clrMapOvr>
+    <a:masterClrMapping/>
+  </p:clrMapOvr>
+</p:sld>
+</file>
+
+<file path=ppt/slides/slide4.xml><?xml version="1.0" encoding="utf-8"?>
+<p:sld xmlns:a="http://schemas.openxmlformats.org/drawingml/2006/main" xmlns:r="http://schemas.openxmlformats.org/officeDocument/2006/relationships" xmlns:p="http://schemas.openxmlformats.org/presentationml/2006/main">
+  <p:cSld>
+    <p:spTree>
+      <p:nvGrpSpPr>
+        <p:cNvPr id="1" name=""/>
+        <p:cNvGrpSpPr/>
+        <p:nvPr/>
+      </p:nvGrpSpPr>
+      <p:grpSpPr>
+        <a:xfrm>
+          <a:off x="0" y="0"/>
+          <a:ext cx="0" cy="0"/>
+          <a:chOff x="0" y="0"/>
+          <a:chExt cx="0" cy="0"/>
+        </a:xfrm>
+      </p:grpSpPr>
+      <p:sp>
+        <p:nvSpPr>
+          <p:cNvPr id="2" name="Заголовок 1">
+            <a:extLst>
+              <a:ext uri="{FF2B5EF4-FFF2-40B4-BE49-F238E27FC236}">
+                <a16:creationId xmlns:a16="http://schemas.microsoft.com/office/drawing/2014/main" id="{CE71DE31-2DE0-4926-BEC6-E6A8901B8F0F}"/>
+              </a:ext>
+            </a:extLst>
+          </p:cNvPr>
+          <p:cNvSpPr>
+            <a:spLocks noGrp="1"/>
+          </p:cNvSpPr>
+          <p:nvPr>
+            <p:ph type="ctrTitle"/>
+          </p:nvPr>
+        </p:nvSpPr>
+        <p:spPr/>
+        <p:txBody>
+          <a:bodyPr/>
+          <a:lstStyle/>
+          <a:p>
+            <a:r>
+              <a:rPr lang="uk-UA" dirty="0"/>
+              <a:t>Альтернативне програмне </a:t>
+            </a:r>
+            <a:r>
+              <a:rPr lang="uk-UA" dirty="0" err="1"/>
+              <a:t>забеспечення</a:t>
+            </a:r>
+            <a:endParaRPr lang="ru-RU" dirty="0"/>
+          </a:p>
+        </p:txBody>
+      </p:sp>
+      <p:sp>
+        <p:nvSpPr>
+          <p:cNvPr id="3" name="Подзаголовок 2">
+            <a:extLst>
+              <a:ext uri="{FF2B5EF4-FFF2-40B4-BE49-F238E27FC236}">
+                <a16:creationId xmlns:a16="http://schemas.microsoft.com/office/drawing/2014/main" id="{26E92C52-9B3B-4575-8312-914431524EF3}"/>
+              </a:ext>
+            </a:extLst>
+          </p:cNvPr>
+          <p:cNvSpPr>
+            <a:spLocks noGrp="1"/>
+          </p:cNvSpPr>
+          <p:nvPr>
+            <p:ph type="subTitle" idx="1"/>
+          </p:nvPr>
+        </p:nvSpPr>
+        <p:spPr/>
+        <p:txBody>
+          <a:bodyPr/>
+          <a:lstStyle/>
+          <a:p>
+            <a:endParaRPr lang="ru-RU"/>
+          </a:p>
+        </p:txBody>
+      </p:sp>
+    </p:spTree>
+    <p:extLst>
+      <p:ext uri="{BB962C8B-B14F-4D97-AF65-F5344CB8AC3E}">
+        <p14:creationId xmlns:p14="http://schemas.microsoft.com/office/powerpoint/2010/main" val="2637720374"/>
+      </p:ext>
+    </p:extLst>
+  </p:cSld>
+  <p:clrMapOvr>
+    <a:masterClrMapping/>
+  </p:clrMapOvr>
+</p:sld>
+</file>
+
+<file path=ppt/slides/slide5.xml><?xml version="1.0" encoding="utf-8"?>
+<p:sld xmlns:a="http://schemas.openxmlformats.org/drawingml/2006/main" xmlns:r="http://schemas.openxmlformats.org/officeDocument/2006/relationships" xmlns:p="http://schemas.openxmlformats.org/presentationml/2006/main">
+  <p:cSld>
+    <p:spTree>
+      <p:nvGrpSpPr>
+        <p:cNvPr id="1" name=""/>
+        <p:cNvGrpSpPr/>
+        <p:nvPr/>
+      </p:nvGrpSpPr>
+      <p:grpSpPr>
+        <a:xfrm>
+          <a:off x="0" y="0"/>
+          <a:ext cx="0" cy="0"/>
+          <a:chOff x="0" y="0"/>
+          <a:chExt cx="0" cy="0"/>
+        </a:xfrm>
+      </p:grpSpPr>
+      <p:sp>
+        <p:nvSpPr>
+          <p:cNvPr id="2" name="Заголовок 1">
+            <a:extLst>
+              <a:ext uri="{FF2B5EF4-FFF2-40B4-BE49-F238E27FC236}">
+                <a16:creationId xmlns:a16="http://schemas.microsoft.com/office/drawing/2014/main" id="{8FFA8EDD-5CF8-4175-9220-E9DAFFCCD61A}"/>
+              </a:ext>
+            </a:extLst>
+          </p:cNvPr>
+          <p:cNvSpPr>
+            <a:spLocks noGrp="1"/>
+          </p:cNvSpPr>
+          <p:nvPr>
+            <p:ph type="title"/>
+          </p:nvPr>
+        </p:nvSpPr>
+        <p:spPr/>
+        <p:txBody>
+          <a:bodyPr/>
+          <a:lstStyle/>
+          <a:p>
+            <a:r>
+              <a:rPr lang="en-US" dirty="0"/>
+              <a:t>Aida64</a:t>
+            </a:r>
+            <a:endParaRPr lang="ru-RU" dirty="0"/>
+          </a:p>
+        </p:txBody>
+      </p:sp>
+      <p:pic>
+        <p:nvPicPr>
+          <p:cNvPr id="5" name="Рисунок 4">
+            <a:extLst>
+              <a:ext uri="{FF2B5EF4-FFF2-40B4-BE49-F238E27FC236}">
+                <a16:creationId xmlns:a16="http://schemas.microsoft.com/office/drawing/2014/main" id="{837FD896-FBCE-4A12-9B7E-944E5AC393B0}"/>
+              </a:ext>
+            </a:extLst>
+          </p:cNvPr>
+          <p:cNvPicPr>
+            <a:picLocks noGrp="1" noChangeAspect="1"/>
+          </p:cNvPicPr>
+          <p:nvPr>
+            <p:ph type="pic" idx="1"/>
+          </p:nvPr>
+        </p:nvPicPr>
+        <p:blipFill rotWithShape="1">
+          <a:blip r:embed="rId2"/>
+          <a:srcRect t="6212" b="-70"/>
+          <a:stretch/>
+        </p:blipFill>
+        <p:spPr>
+          <a:xfrm>
+            <a:off x="2324561" y="0"/>
+            <a:ext cx="6949440" cy="4690493"/>
+          </a:xfrm>
+          <a:prstGeom prst="rect">
+            <a:avLst/>
+          </a:prstGeom>
+        </p:spPr>
+      </p:pic>
+      <p:sp>
+        <p:nvSpPr>
+          <p:cNvPr id="4" name="Текст 3">
+            <a:extLst>
+              <a:ext uri="{FF2B5EF4-FFF2-40B4-BE49-F238E27FC236}">
+                <a16:creationId xmlns:a16="http://schemas.microsoft.com/office/drawing/2014/main" id="{1EDEC3E3-75A0-4E76-AEBD-59A54718E118}"/>
+              </a:ext>
+            </a:extLst>
+          </p:cNvPr>
+          <p:cNvSpPr>
+            <a:spLocks noGrp="1"/>
+          </p:cNvSpPr>
+          <p:nvPr>
+            <p:ph type="body" sz="half" idx="2"/>
+          </p:nvPr>
+        </p:nvSpPr>
+        <p:spPr/>
+        <p:txBody>
+          <a:bodyPr/>
+          <a:lstStyle/>
+          <a:p>
+            <a:r>
+              <a:rPr lang="uk-UA" dirty="0"/>
+              <a:t>Дозволяє отримати інформацію про операційну систему та компоненти комп’ютеру</a:t>
+            </a:r>
+            <a:endParaRPr lang="ru-RU" dirty="0"/>
+          </a:p>
+        </p:txBody>
+      </p:sp>
+    </p:spTree>
+    <p:extLst>
+      <p:ext uri="{BB962C8B-B14F-4D97-AF65-F5344CB8AC3E}">
+        <p14:creationId xmlns:p14="http://schemas.microsoft.com/office/powerpoint/2010/main" val="2155639078"/>
+      </p:ext>
+    </p:extLst>
+  </p:cSld>
+  <p:clrMapOvr>
+    <a:masterClrMapping/>
+  </p:clrMapOvr>
+</p:sld>
+</file>
+
+<file path=ppt/slides/slide6.xml><?xml version="1.0" encoding="utf-8"?>
+<p:sld xmlns:a="http://schemas.openxmlformats.org/drawingml/2006/main" xmlns:r="http://schemas.openxmlformats.org/officeDocument/2006/relationships" xmlns:p="http://schemas.openxmlformats.org/presentationml/2006/main">
+  <p:cSld>
+    <p:spTree>
+      <p:nvGrpSpPr>
+        <p:cNvPr id="1" name=""/>
+        <p:cNvGrpSpPr/>
+        <p:nvPr/>
+      </p:nvGrpSpPr>
+      <p:grpSpPr>
+        <a:xfrm>
+          <a:off x="0" y="0"/>
+          <a:ext cx="0" cy="0"/>
+          <a:chOff x="0" y="0"/>
+          <a:chExt cx="0" cy="0"/>
+        </a:xfrm>
+      </p:grpSpPr>
+      <p:sp>
+        <p:nvSpPr>
+          <p:cNvPr id="2" name="Заголовок 1">
+            <a:extLst>
+              <a:ext uri="{FF2B5EF4-FFF2-40B4-BE49-F238E27FC236}">
+                <a16:creationId xmlns:a16="http://schemas.microsoft.com/office/drawing/2014/main" id="{8FFA8EDD-5CF8-4175-9220-E9DAFFCCD61A}"/>
+              </a:ext>
+            </a:extLst>
+          </p:cNvPr>
+          <p:cNvSpPr>
+            <a:spLocks noGrp="1"/>
+          </p:cNvSpPr>
+          <p:nvPr>
+            <p:ph type="title"/>
+          </p:nvPr>
+        </p:nvSpPr>
+        <p:spPr/>
+        <p:txBody>
+          <a:bodyPr/>
+          <a:lstStyle/>
+          <a:p>
+            <a:r>
+              <a:rPr lang="en-US" dirty="0" err="1"/>
+              <a:t>CrystalDiskInfo</a:t>
+            </a:r>
+            <a:endParaRPr lang="ru-RU" dirty="0"/>
+          </a:p>
+        </p:txBody>
+      </p:sp>
+      <p:sp>
+        <p:nvSpPr>
+          <p:cNvPr id="4" name="Текст 3">
+            <a:extLst>
+              <a:ext uri="{FF2B5EF4-FFF2-40B4-BE49-F238E27FC236}">
+                <a16:creationId xmlns:a16="http://schemas.microsoft.com/office/drawing/2014/main" id="{1EDEC3E3-75A0-4E76-AEBD-59A54718E118}"/>
+              </a:ext>
+            </a:extLst>
+          </p:cNvPr>
+          <p:cNvSpPr>
+            <a:spLocks noGrp="1"/>
+          </p:cNvSpPr>
+          <p:nvPr>
+            <p:ph type="body" sz="half" idx="2"/>
+          </p:nvPr>
+        </p:nvSpPr>
+        <p:spPr/>
+        <p:txBody>
+          <a:bodyPr/>
+          <a:lstStyle/>
+          <a:p>
+            <a:r>
+              <a:rPr lang="uk-UA" dirty="0"/>
+              <a:t>Дозволяє отримати інформацію про фізичні носії комп’ютеру</a:t>
+            </a:r>
+            <a:endParaRPr lang="ru-RU" dirty="0"/>
+          </a:p>
+        </p:txBody>
+      </p:sp>
+      <p:pic>
+        <p:nvPicPr>
+          <p:cNvPr id="3" name="Рисунок 2">
+            <a:extLst>
+              <a:ext uri="{FF2B5EF4-FFF2-40B4-BE49-F238E27FC236}">
+                <a16:creationId xmlns:a16="http://schemas.microsoft.com/office/drawing/2014/main" id="{721C6970-13F5-4600-9389-3D7D6520EAEC}"/>
+              </a:ext>
+            </a:extLst>
+          </p:cNvPr>
+          <p:cNvPicPr>
+            <a:picLocks noChangeAspect="1"/>
+          </p:cNvPicPr>
+          <p:nvPr/>
+        </p:nvPicPr>
+        <p:blipFill>
+          <a:blip r:embed="rId2"/>
+          <a:stretch>
+            <a:fillRect/>
+          </a:stretch>
+        </p:blipFill>
+        <p:spPr>
+          <a:xfrm>
+            <a:off x="3554137" y="0"/>
+            <a:ext cx="5719863" cy="4800600"/>
+          </a:xfrm>
+          <a:prstGeom prst="rect">
+            <a:avLst/>
+          </a:prstGeom>
+        </p:spPr>
+      </p:pic>
+    </p:spTree>
+    <p:extLst>
+      <p:ext uri="{BB962C8B-B14F-4D97-AF65-F5344CB8AC3E}">
+        <p14:creationId xmlns:p14="http://schemas.microsoft.com/office/powerpoint/2010/main" val="980081571"/>
+      </p:ext>
+    </p:extLst>
+  </p:cSld>
+  <p:clrMapOvr>
+    <a:masterClrMapping/>
+  </p:clrMapOvr>
+</p:sld>
+</file>
+
+<file path=ppt/slides/slide7.xml><?xml version="1.0" encoding="utf-8"?>
+<p:sld xmlns:a="http://schemas.openxmlformats.org/drawingml/2006/main" xmlns:r="http://schemas.openxmlformats.org/officeDocument/2006/relationships" xmlns:p="http://schemas.openxmlformats.org/presentationml/2006/main">
+  <p:cSld>
+    <p:spTree>
+      <p:nvGrpSpPr>
+        <p:cNvPr id="1" name=""/>
+        <p:cNvGrpSpPr/>
+        <p:nvPr/>
+      </p:nvGrpSpPr>
+      <p:grpSpPr>
+        <a:xfrm>
+          <a:off x="0" y="0"/>
+          <a:ext cx="0" cy="0"/>
+          <a:chOff x="0" y="0"/>
+          <a:chExt cx="0" cy="0"/>
+        </a:xfrm>
+      </p:grpSpPr>
+      <p:sp>
+        <p:nvSpPr>
+          <p:cNvPr id="2" name="Заголовок 1">
+            <a:extLst>
+              <a:ext uri="{FF2B5EF4-FFF2-40B4-BE49-F238E27FC236}">
+                <a16:creationId xmlns:a16="http://schemas.microsoft.com/office/drawing/2014/main" id="{8FFA8EDD-5CF8-4175-9220-E9DAFFCCD61A}"/>
+              </a:ext>
+            </a:extLst>
+          </p:cNvPr>
+          <p:cNvSpPr>
+            <a:spLocks noGrp="1"/>
+          </p:cNvSpPr>
+          <p:nvPr>
+            <p:ph type="title"/>
+          </p:nvPr>
+        </p:nvSpPr>
+        <p:spPr/>
+        <p:txBody>
+          <a:bodyPr/>
+          <a:lstStyle/>
+          <a:p>
+            <a:r>
+              <a:rPr lang="en-US" dirty="0" err="1"/>
+              <a:t>CCleaner</a:t>
+            </a:r>
+            <a:endParaRPr lang="ru-RU" dirty="0"/>
+          </a:p>
+        </p:txBody>
+      </p:sp>
+      <p:sp>
+        <p:nvSpPr>
+          <p:cNvPr id="4" name="Текст 3">
+            <a:extLst>
+              <a:ext uri="{FF2B5EF4-FFF2-40B4-BE49-F238E27FC236}">
+                <a16:creationId xmlns:a16="http://schemas.microsoft.com/office/drawing/2014/main" id="{1EDEC3E3-75A0-4E76-AEBD-59A54718E118}"/>
+              </a:ext>
+            </a:extLst>
+          </p:cNvPr>
+          <p:cNvSpPr>
+            <a:spLocks noGrp="1"/>
+          </p:cNvSpPr>
+          <p:nvPr>
+            <p:ph type="body" sz="half" idx="2"/>
+          </p:nvPr>
+        </p:nvSpPr>
+        <p:spPr/>
+        <p:txBody>
+          <a:bodyPr/>
+          <a:lstStyle/>
+          <a:p>
+            <a:r>
+              <a:rPr lang="uk-UA" dirty="0"/>
+              <a:t>Дозволяє отримати інформацію про встановлене програмне забезпечення</a:t>
+            </a:r>
+            <a:endParaRPr lang="ru-RU" dirty="0"/>
+          </a:p>
+        </p:txBody>
+      </p:sp>
+      <p:pic>
+        <p:nvPicPr>
+          <p:cNvPr id="7" name="Рисунок 6">
+            <a:extLst>
+              <a:ext uri="{FF2B5EF4-FFF2-40B4-BE49-F238E27FC236}">
+                <a16:creationId xmlns:a16="http://schemas.microsoft.com/office/drawing/2014/main" id="{CE0F4843-51B0-4CE5-8443-14485598CD36}"/>
+              </a:ext>
+            </a:extLst>
+          </p:cNvPr>
+          <p:cNvPicPr>
+            <a:picLocks noChangeAspect="1"/>
+          </p:cNvPicPr>
+          <p:nvPr/>
+        </p:nvPicPr>
+        <p:blipFill>
+          <a:blip r:embed="rId2"/>
+          <a:stretch>
+            <a:fillRect/>
+          </a:stretch>
+        </p:blipFill>
+        <p:spPr>
+          <a:xfrm>
+            <a:off x="3062962" y="0"/>
+            <a:ext cx="6211039" cy="4305993"/>
+          </a:xfrm>
+          <a:prstGeom prst="rect">
+            <a:avLst/>
+          </a:prstGeom>
+        </p:spPr>
+      </p:pic>
+    </p:spTree>
+    <p:extLst>
+      <p:ext uri="{BB962C8B-B14F-4D97-AF65-F5344CB8AC3E}">
+        <p14:creationId xmlns:p14="http://schemas.microsoft.com/office/powerpoint/2010/main" val="2449773318"/>
+      </p:ext>
+    </p:extLst>
+  </p:cSld>
+  <p:clrMapOvr>
+    <a:masterClrMapping/>
+  </p:clrMapOvr>
+</p:sld>
+</file>
+
 <file path=ppt/slides/slide8.xml><?xml version="1.0" encoding="utf-8"?>
 <p:sld xmlns:a="http://schemas.openxmlformats.org/drawingml/2006/main" xmlns:r="http://schemas.openxmlformats.org/officeDocument/2006/relationships" xmlns:p="http://schemas.openxmlformats.org/presentationml/2006/main">
   <p:cSld>
@@ -6982,7 +8265,7 @@
           <p:cNvPr id="2" name="Заголовок 1">
             <a:extLst>
               <a:ext uri="{FF2B5EF4-FFF2-40B4-BE49-F238E27FC236}">
-                <a16:creationId xmlns:a16="http://schemas.microsoft.com/office/drawing/2014/main" id="{A3ADA424-F931-4515-A9EF-C7997798AB88}"/>
+                <a16:creationId xmlns:a16="http://schemas.microsoft.com/office/drawing/2014/main" id="{24984D14-A55A-4AEB-A5A6-2F3EA5A238E6}"/>
               </a:ext>
             </a:extLst>
           </p:cNvPr>
@@ -6990,7 +8273,7 @@
             <a:spLocks noGrp="1"/>
           </p:cNvSpPr>
           <p:nvPr>
-            <p:ph type="ctrTitle"/>
+            <p:ph type="title"/>
           </p:nvPr>
         </p:nvSpPr>
         <p:spPr/>
@@ -7000,7 +8283,7 @@
           <a:p>
             <a:r>
               <a:rPr lang="uk-UA" dirty="0"/>
-              <a:t>Хід розробки</a:t>
+              <a:t>Висновок</a:t>
             </a:r>
             <a:endParaRPr lang="ru-RU" dirty="0"/>
           </a:p>
@@ -7008,10 +8291,10 @@
       </p:sp>
       <p:sp>
         <p:nvSpPr>
-          <p:cNvPr id="3" name="Подзаголовок 2">
+          <p:cNvPr id="3" name="Объект 2">
             <a:extLst>
               <a:ext uri="{FF2B5EF4-FFF2-40B4-BE49-F238E27FC236}">
-                <a16:creationId xmlns:a16="http://schemas.microsoft.com/office/drawing/2014/main" id="{7F6101D8-33E5-497A-981D-CBAEA5E2031F}"/>
+                <a16:creationId xmlns:a16="http://schemas.microsoft.com/office/drawing/2014/main" id="{4F7DD7C5-4D46-4D28-AB36-ED2428D581E4}"/>
               </a:ext>
             </a:extLst>
           </p:cNvPr>
@@ -7019,14 +8302,24 @@
             <a:spLocks noGrp="1"/>
           </p:cNvSpPr>
           <p:nvPr>
-            <p:ph type="subTitle" idx="1"/>
-          </p:nvPr>
-        </p:nvSpPr>
-        <p:spPr/>
-        <p:txBody>
-          <a:bodyPr/>
-          <a:lstStyle/>
-          <a:p>
+            <p:ph idx="1"/>
+          </p:nvPr>
+        </p:nvSpPr>
+        <p:spPr/>
+        <p:txBody>
+          <a:bodyPr/>
+          <a:lstStyle/>
+          <a:p>
+            <a:r>
+              <a:rPr lang="uk-UA" dirty="0"/>
+              <a:t>Жодна с програм не володіє усім переліком необхідних функцій одночасно</a:t>
+            </a:r>
+          </a:p>
+          <a:p>
+            <a:r>
+              <a:rPr lang="uk-UA" dirty="0"/>
+              <a:t>Створення власного програмного застосунку є виправданим</a:t>
+            </a:r>
             <a:endParaRPr lang="ru-RU" dirty="0"/>
           </a:p>
         </p:txBody>
@@ -7034,7 +8327,7 @@
     </p:spTree>
     <p:extLst>
       <p:ext uri="{BB962C8B-B14F-4D97-AF65-F5344CB8AC3E}">
-        <p14:creationId xmlns:p14="http://schemas.microsoft.com/office/powerpoint/2010/main" val="151012432"/>
+        <p14:creationId xmlns:p14="http://schemas.microsoft.com/office/powerpoint/2010/main" val="3055192345"/>
       </p:ext>
     </p:extLst>
   </p:cSld>
@@ -7066,7 +8359,7 @@
           <p:cNvPr id="2" name="Заголовок 1">
             <a:extLst>
               <a:ext uri="{FF2B5EF4-FFF2-40B4-BE49-F238E27FC236}">
-                <a16:creationId xmlns:a16="http://schemas.microsoft.com/office/drawing/2014/main" id="{724DA49A-87A5-4357-A780-A04098F3DEEA}"/>
+                <a16:creationId xmlns:a16="http://schemas.microsoft.com/office/drawing/2014/main" id="{FD48F228-7FA6-4B38-96D9-54048ED72CEE}"/>
               </a:ext>
             </a:extLst>
           </p:cNvPr>
@@ -7074,7 +8367,7 @@
             <a:spLocks noGrp="1"/>
           </p:cNvSpPr>
           <p:nvPr>
-            <p:ph type="title"/>
+            <p:ph type="ctrTitle"/>
           </p:nvPr>
         </p:nvSpPr>
         <p:spPr/>
@@ -7084,11 +8377,7 @@
           <a:p>
             <a:r>
               <a:rPr lang="uk-UA" dirty="0"/>
-              <a:t>1. Використання </a:t>
-            </a:r>
-            <a:r>
-              <a:rPr lang="en-US" dirty="0"/>
-              <a:t>Windows API</a:t>
+              <a:t>Можливі засоби розробки</a:t>
             </a:r>
             <a:endParaRPr lang="ru-RU" dirty="0"/>
           </a:p>
@@ -7096,10 +8385,10 @@
       </p:sp>
       <p:sp>
         <p:nvSpPr>
-          <p:cNvPr id="3" name="Объект 2">
+          <p:cNvPr id="3" name="Подзаголовок 2">
             <a:extLst>
               <a:ext uri="{FF2B5EF4-FFF2-40B4-BE49-F238E27FC236}">
-                <a16:creationId xmlns:a16="http://schemas.microsoft.com/office/drawing/2014/main" id="{D704EBCE-B827-4585-BB40-A040858FC07C}"/>
+                <a16:creationId xmlns:a16="http://schemas.microsoft.com/office/drawing/2014/main" id="{3D51FBFB-E386-428D-AE75-A92AF86CEAEB}"/>
               </a:ext>
             </a:extLst>
           </p:cNvPr>
@@ -7107,32 +8396,14 @@
             <a:spLocks noGrp="1"/>
           </p:cNvSpPr>
           <p:nvPr>
-            <p:ph idx="1"/>
-          </p:nvPr>
-        </p:nvSpPr>
-        <p:spPr/>
-        <p:txBody>
-          <a:bodyPr/>
-          <a:lstStyle/>
-          <a:p>
-            <a:r>
-              <a:rPr lang="uk-UA" dirty="0"/>
-              <a:t>Початкова ідея – використання </a:t>
-            </a:r>
-            <a:r>
-              <a:rPr lang="en-US" dirty="0"/>
-              <a:t>Windows API </a:t>
-            </a:r>
-            <a:r>
-              <a:rPr lang="uk-UA" dirty="0"/>
-              <a:t>для усіх модулів системи</a:t>
-            </a:r>
-          </a:p>
-          <a:p>
-            <a:r>
-              <a:rPr lang="uk-UA" dirty="0"/>
-              <a:t>Причина відмови – відсутність гнучкості та універсальності, різні засоби звертання до кожного компонента системи</a:t>
-            </a:r>
+            <p:ph type="subTitle" idx="1"/>
+          </p:nvPr>
+        </p:nvSpPr>
+        <p:spPr/>
+        <p:txBody>
+          <a:bodyPr/>
+          <a:lstStyle/>
+          <a:p>
             <a:endParaRPr lang="ru-RU" dirty="0"/>
           </a:p>
         </p:txBody>
@@ -7140,7 +8411,7 @@
     </p:spTree>
     <p:extLst>
       <p:ext uri="{BB962C8B-B14F-4D97-AF65-F5344CB8AC3E}">
-        <p14:creationId xmlns:p14="http://schemas.microsoft.com/office/powerpoint/2010/main" val="4271271887"/>
+        <p14:creationId xmlns:p14="http://schemas.microsoft.com/office/powerpoint/2010/main" val="1508207953"/>
       </p:ext>
     </p:extLst>
   </p:cSld>

</xml_diff>